<commit_message>
more work on part I
</commit_message>
<xml_diff>
--- a/figures/matsimcycle.pptx
+++ b/figures/matsimcycle.pptx
@@ -288,7 +288,7 @@
           <a:p>
             <a:fld id="{4DCEFEF8-8E96-49FA-934F-CB0222463FE5}" type="datetimeFigureOut">
               <a:rPr lang="en-US" smtClean="0"/>
-              <a:t>2/25/2014</a:t>
+              <a:t>18/01/15</a:t>
             </a:fld>
             <a:endParaRPr lang="en-US"/>
           </a:p>
@@ -458,7 +458,7 @@
           <a:p>
             <a:fld id="{4DCEFEF8-8E96-49FA-934F-CB0222463FE5}" type="datetimeFigureOut">
               <a:rPr lang="en-US" smtClean="0"/>
-              <a:t>2/25/2014</a:t>
+              <a:t>18/01/15</a:t>
             </a:fld>
             <a:endParaRPr lang="en-US"/>
           </a:p>
@@ -638,7 +638,7 @@
           <a:p>
             <a:fld id="{4DCEFEF8-8E96-49FA-934F-CB0222463FE5}" type="datetimeFigureOut">
               <a:rPr lang="en-US" smtClean="0"/>
-              <a:t>2/25/2014</a:t>
+              <a:t>18/01/15</a:t>
             </a:fld>
             <a:endParaRPr lang="en-US"/>
           </a:p>
@@ -808,7 +808,7 @@
           <a:p>
             <a:fld id="{4DCEFEF8-8E96-49FA-934F-CB0222463FE5}" type="datetimeFigureOut">
               <a:rPr lang="en-US" smtClean="0"/>
-              <a:t>2/25/2014</a:t>
+              <a:t>18/01/15</a:t>
             </a:fld>
             <a:endParaRPr lang="en-US"/>
           </a:p>
@@ -1054,7 +1054,7 @@
           <a:p>
             <a:fld id="{4DCEFEF8-8E96-49FA-934F-CB0222463FE5}" type="datetimeFigureOut">
               <a:rPr lang="en-US" smtClean="0"/>
-              <a:t>2/25/2014</a:t>
+              <a:t>18/01/15</a:t>
             </a:fld>
             <a:endParaRPr lang="en-US"/>
           </a:p>
@@ -1342,7 +1342,7 @@
           <a:p>
             <a:fld id="{4DCEFEF8-8E96-49FA-934F-CB0222463FE5}" type="datetimeFigureOut">
               <a:rPr lang="en-US" smtClean="0"/>
-              <a:t>2/25/2014</a:t>
+              <a:t>18/01/15</a:t>
             </a:fld>
             <a:endParaRPr lang="en-US"/>
           </a:p>
@@ -1769,7 +1769,7 @@
           <a:p>
             <a:fld id="{4DCEFEF8-8E96-49FA-934F-CB0222463FE5}" type="datetimeFigureOut">
               <a:rPr lang="en-US" smtClean="0"/>
-              <a:t>2/25/2014</a:t>
+              <a:t>18/01/15</a:t>
             </a:fld>
             <a:endParaRPr lang="en-US"/>
           </a:p>
@@ -1887,7 +1887,7 @@
           <a:p>
             <a:fld id="{4DCEFEF8-8E96-49FA-934F-CB0222463FE5}" type="datetimeFigureOut">
               <a:rPr lang="en-US" smtClean="0"/>
-              <a:t>2/25/2014</a:t>
+              <a:t>18/01/15</a:t>
             </a:fld>
             <a:endParaRPr lang="en-US"/>
           </a:p>
@@ -1982,7 +1982,7 @@
           <a:p>
             <a:fld id="{4DCEFEF8-8E96-49FA-934F-CB0222463FE5}" type="datetimeFigureOut">
               <a:rPr lang="en-US" smtClean="0"/>
-              <a:t>2/25/2014</a:t>
+              <a:t>18/01/15</a:t>
             </a:fld>
             <a:endParaRPr lang="en-US"/>
           </a:p>
@@ -2259,7 +2259,7 @@
           <a:p>
             <a:fld id="{4DCEFEF8-8E96-49FA-934F-CB0222463FE5}" type="datetimeFigureOut">
               <a:rPr lang="en-US" smtClean="0"/>
-              <a:t>2/25/2014</a:t>
+              <a:t>18/01/15</a:t>
             </a:fld>
             <a:endParaRPr lang="en-US"/>
           </a:p>
@@ -2512,7 +2512,7 @@
           <a:p>
             <a:fld id="{4DCEFEF8-8E96-49FA-934F-CB0222463FE5}" type="datetimeFigureOut">
               <a:rPr lang="en-US" smtClean="0"/>
-              <a:t>2/25/2014</a:t>
+              <a:t>18/01/15</a:t>
             </a:fld>
             <a:endParaRPr lang="en-US"/>
           </a:p>
@@ -2725,7 +2725,7 @@
           <a:p>
             <a:fld id="{4DCEFEF8-8E96-49FA-934F-CB0222463FE5}" type="datetimeFigureOut">
               <a:rPr lang="en-US" smtClean="0"/>
-              <a:t>2/25/2014</a:t>
+              <a:t>18/01/15</a:t>
             </a:fld>
             <a:endParaRPr lang="en-US"/>
           </a:p>
@@ -3792,14 +3792,20 @@
             <a:p>
               <a:pPr algn="ctr" eaLnBrk="1" hangingPunct="1"/>
               <a:r>
-                <a:rPr lang="en-US" altLang="en-US" sz="1800">
+                <a:rPr lang="en-US" altLang="en-US" sz="1800" smtClean="0">
                   <a:solidFill>
                     <a:srgbClr val="FFFFFF"/>
                   </a:solidFill>
                   <a:cs typeface="Arial" charset="0"/>
                 </a:rPr>
-                <a:t>execution</a:t>
+                <a:t>mobsim</a:t>
               </a:r>
+              <a:endParaRPr lang="en-US" altLang="en-US" sz="1800" dirty="0">
+                <a:solidFill>
+                  <a:srgbClr val="FFFFFF"/>
+                </a:solidFill>
+                <a:cs typeface="Arial" charset="0"/>
+              </a:endParaRPr>
             </a:p>
           </p:txBody>
         </p:sp>

</xml_diff>

<commit_message>
replace gray shadow with white line
</commit_message>
<xml_diff>
--- a/figures/matsimcycle.pptx
+++ b/figures/matsimcycle.pptx
@@ -288,7 +288,7 @@
           <a:p>
             <a:fld id="{4DCEFEF8-8E96-49FA-934F-CB0222463FE5}" type="datetimeFigureOut">
               <a:rPr lang="en-US" smtClean="0"/>
-              <a:t>18/01/15</a:t>
+              <a:t>28/01/15</a:t>
             </a:fld>
             <a:endParaRPr lang="en-US"/>
           </a:p>
@@ -458,7 +458,7 @@
           <a:p>
             <a:fld id="{4DCEFEF8-8E96-49FA-934F-CB0222463FE5}" type="datetimeFigureOut">
               <a:rPr lang="en-US" smtClean="0"/>
-              <a:t>18/01/15</a:t>
+              <a:t>28/01/15</a:t>
             </a:fld>
             <a:endParaRPr lang="en-US"/>
           </a:p>
@@ -638,7 +638,7 @@
           <a:p>
             <a:fld id="{4DCEFEF8-8E96-49FA-934F-CB0222463FE5}" type="datetimeFigureOut">
               <a:rPr lang="en-US" smtClean="0"/>
-              <a:t>18/01/15</a:t>
+              <a:t>28/01/15</a:t>
             </a:fld>
             <a:endParaRPr lang="en-US"/>
           </a:p>
@@ -808,7 +808,7 @@
           <a:p>
             <a:fld id="{4DCEFEF8-8E96-49FA-934F-CB0222463FE5}" type="datetimeFigureOut">
               <a:rPr lang="en-US" smtClean="0"/>
-              <a:t>18/01/15</a:t>
+              <a:t>28/01/15</a:t>
             </a:fld>
             <a:endParaRPr lang="en-US"/>
           </a:p>
@@ -1054,7 +1054,7 @@
           <a:p>
             <a:fld id="{4DCEFEF8-8E96-49FA-934F-CB0222463FE5}" type="datetimeFigureOut">
               <a:rPr lang="en-US" smtClean="0"/>
-              <a:t>18/01/15</a:t>
+              <a:t>28/01/15</a:t>
             </a:fld>
             <a:endParaRPr lang="en-US"/>
           </a:p>
@@ -1342,7 +1342,7 @@
           <a:p>
             <a:fld id="{4DCEFEF8-8E96-49FA-934F-CB0222463FE5}" type="datetimeFigureOut">
               <a:rPr lang="en-US" smtClean="0"/>
-              <a:t>18/01/15</a:t>
+              <a:t>28/01/15</a:t>
             </a:fld>
             <a:endParaRPr lang="en-US"/>
           </a:p>
@@ -1769,7 +1769,7 @@
           <a:p>
             <a:fld id="{4DCEFEF8-8E96-49FA-934F-CB0222463FE5}" type="datetimeFigureOut">
               <a:rPr lang="en-US" smtClean="0"/>
-              <a:t>18/01/15</a:t>
+              <a:t>28/01/15</a:t>
             </a:fld>
             <a:endParaRPr lang="en-US"/>
           </a:p>
@@ -1887,7 +1887,7 @@
           <a:p>
             <a:fld id="{4DCEFEF8-8E96-49FA-934F-CB0222463FE5}" type="datetimeFigureOut">
               <a:rPr lang="en-US" smtClean="0"/>
-              <a:t>18/01/15</a:t>
+              <a:t>28/01/15</a:t>
             </a:fld>
             <a:endParaRPr lang="en-US"/>
           </a:p>
@@ -1982,7 +1982,7 @@
           <a:p>
             <a:fld id="{4DCEFEF8-8E96-49FA-934F-CB0222463FE5}" type="datetimeFigureOut">
               <a:rPr lang="en-US" smtClean="0"/>
-              <a:t>18/01/15</a:t>
+              <a:t>28/01/15</a:t>
             </a:fld>
             <a:endParaRPr lang="en-US"/>
           </a:p>
@@ -2259,7 +2259,7 @@
           <a:p>
             <a:fld id="{4DCEFEF8-8E96-49FA-934F-CB0222463FE5}" type="datetimeFigureOut">
               <a:rPr lang="en-US" smtClean="0"/>
-              <a:t>18/01/15</a:t>
+              <a:t>28/01/15</a:t>
             </a:fld>
             <a:endParaRPr lang="en-US"/>
           </a:p>
@@ -2512,7 +2512,7 @@
           <a:p>
             <a:fld id="{4DCEFEF8-8E96-49FA-934F-CB0222463FE5}" type="datetimeFigureOut">
               <a:rPr lang="en-US" smtClean="0"/>
-              <a:t>18/01/15</a:t>
+              <a:t>28/01/15</a:t>
             </a:fld>
             <a:endParaRPr lang="en-US"/>
           </a:p>
@@ -2725,7 +2725,7 @@
           <a:p>
             <a:fld id="{4DCEFEF8-8E96-49FA-934F-CB0222463FE5}" type="datetimeFigureOut">
               <a:rPr lang="en-US" smtClean="0"/>
-              <a:t>18/01/15</a:t>
+              <a:t>28/01/15</a:t>
             </a:fld>
             <a:endParaRPr lang="en-US"/>
           </a:p>
@@ -3100,1846 +3100,1971 @@
           <a:chExt cx="0" cy="0"/>
         </a:xfrm>
       </p:grpSpPr>
-      <p:grpSp>
-        <p:nvGrpSpPr>
-          <p:cNvPr id="6" name="Group 17"/>
-          <p:cNvGrpSpPr>
-            <a:grpSpLocks/>
-          </p:cNvGrpSpPr>
+      <p:cxnSp>
+        <p:nvCxnSpPr>
+          <p:cNvPr id="7" name="Straight Connector 6"/>
+          <p:cNvCxnSpPr/>
           <p:nvPr/>
-        </p:nvGrpSpPr>
-        <p:grpSpPr bwMode="auto">
+        </p:nvCxnSpPr>
+        <p:spPr bwMode="auto">
           <a:xfrm>
-            <a:off x="455612" y="911720"/>
-            <a:ext cx="8229600" cy="1752601"/>
-            <a:chOff x="457200" y="4038600"/>
-            <a:chExt cx="8229600" cy="1752600"/>
+            <a:off x="760412" y="1214933"/>
+            <a:ext cx="7543800" cy="1587"/>
           </a:xfrm>
-        </p:grpSpPr>
-        <p:cxnSp>
-          <p:nvCxnSpPr>
-            <p:cNvPr id="7" name="Straight Connector 6"/>
-            <p:cNvCxnSpPr/>
-            <p:nvPr/>
-          </p:nvCxnSpPr>
-          <p:spPr bwMode="auto">
-            <a:xfrm>
-              <a:off x="762000" y="4341813"/>
-              <a:ext cx="7543800" cy="1587"/>
-            </a:xfrm>
-            <a:prstGeom prst="line">
-              <a:avLst/>
-            </a:prstGeom>
-            <a:ln w="101600">
-              <a:solidFill>
-                <a:schemeClr val="accent1"/>
-              </a:solidFill>
-            </a:ln>
-            <a:effectLst/>
-          </p:spPr>
-          <p:style>
-            <a:lnRef idx="2">
+          <a:prstGeom prst="line">
+            <a:avLst/>
+          </a:prstGeom>
+          <a:ln w="101600">
+            <a:solidFill>
               <a:schemeClr val="accent1"/>
-            </a:lnRef>
-            <a:fillRef idx="0">
-              <a:schemeClr val="accent1"/>
-            </a:fillRef>
-            <a:effectRef idx="1">
-              <a:schemeClr val="accent1"/>
-            </a:effectRef>
-            <a:fontRef idx="minor">
-              <a:schemeClr val="tx1"/>
-            </a:fontRef>
-          </p:style>
-        </p:cxnSp>
-        <p:sp>
-          <p:nvSpPr>
-            <p:cNvPr id="8" name="Rounded Rectangle 7"/>
-            <p:cNvSpPr>
-              <a:spLocks noChangeArrowheads="1"/>
-            </p:cNvSpPr>
-            <p:nvPr/>
-          </p:nvSpPr>
-          <p:spPr bwMode="auto">
-            <a:xfrm>
-              <a:off x="2133600" y="4343400"/>
-              <a:ext cx="4876800" cy="1143000"/>
-            </a:xfrm>
-            <a:prstGeom prst="roundRect">
-              <a:avLst>
-                <a:gd name="adj" fmla="val 17847"/>
-              </a:avLst>
-            </a:prstGeom>
+            </a:solidFill>
+          </a:ln>
+          <a:effectLst/>
+        </p:spPr>
+        <p:style>
+          <a:lnRef idx="2">
+            <a:schemeClr val="accent1"/>
+          </a:lnRef>
+          <a:fillRef idx="0">
+            <a:schemeClr val="accent1"/>
+          </a:fillRef>
+          <a:effectRef idx="1">
+            <a:schemeClr val="accent1"/>
+          </a:effectRef>
+          <a:fontRef idx="minor">
+            <a:schemeClr val="tx1"/>
+          </a:fontRef>
+        </p:style>
+      </p:cxnSp>
+      <p:sp>
+        <p:nvSpPr>
+          <p:cNvPr id="19" name="Rounded Rectangle 18"/>
+          <p:cNvSpPr>
+            <a:spLocks noChangeArrowheads="1"/>
+          </p:cNvSpPr>
+          <p:nvPr/>
+        </p:nvSpPr>
+        <p:spPr bwMode="auto">
+          <a:xfrm>
+            <a:off x="2132012" y="1216520"/>
+            <a:ext cx="4876800" cy="1143001"/>
+          </a:xfrm>
+          <a:prstGeom prst="roundRect">
+            <a:avLst>
+              <a:gd name="adj" fmla="val 17847"/>
+            </a:avLst>
+          </a:prstGeom>
+          <a:noFill/>
+          <a:ln w="152400">
             <a:solidFill>
               <a:schemeClr val="bg1"/>
             </a:solidFill>
-            <a:ln w="101600">
+            <a:round/>
+            <a:headEnd/>
+            <a:tailEnd/>
+          </a:ln>
+          <a:effectLst/>
+        </p:spPr>
+        <p:txBody>
+          <a:bodyPr anchor="ctr"/>
+          <a:lstStyle>
+            <a:lvl1pPr eaLnBrk="0" hangingPunct="0">
+              <a:defRPr sz="2400">
+                <a:solidFill>
+                  <a:schemeClr val="tx1"/>
+                </a:solidFill>
+                <a:latin typeface="Arial" charset="0"/>
+                <a:ea typeface="ＭＳ Ｐゴシック" charset="-128"/>
+              </a:defRPr>
+            </a:lvl1pPr>
+            <a:lvl2pPr marL="37931725" indent="-37474525" eaLnBrk="0" hangingPunct="0">
+              <a:defRPr sz="2400">
+                <a:solidFill>
+                  <a:schemeClr val="tx1"/>
+                </a:solidFill>
+                <a:latin typeface="Arial" charset="0"/>
+                <a:ea typeface="ＭＳ Ｐゴシック" charset="-128"/>
+              </a:defRPr>
+            </a:lvl2pPr>
+            <a:lvl3pPr eaLnBrk="0" hangingPunct="0">
+              <a:defRPr sz="2400">
+                <a:solidFill>
+                  <a:schemeClr val="tx1"/>
+                </a:solidFill>
+                <a:latin typeface="Arial" charset="0"/>
+                <a:ea typeface="ＭＳ Ｐゴシック" charset="-128"/>
+              </a:defRPr>
+            </a:lvl3pPr>
+            <a:lvl4pPr eaLnBrk="0" hangingPunct="0">
+              <a:defRPr sz="2400">
+                <a:solidFill>
+                  <a:schemeClr val="tx1"/>
+                </a:solidFill>
+                <a:latin typeface="Arial" charset="0"/>
+                <a:ea typeface="ＭＳ Ｐゴシック" charset="-128"/>
+              </a:defRPr>
+            </a:lvl4pPr>
+            <a:lvl5pPr eaLnBrk="0" hangingPunct="0">
+              <a:defRPr sz="2400">
+                <a:solidFill>
+                  <a:schemeClr val="tx1"/>
+                </a:solidFill>
+                <a:latin typeface="Arial" charset="0"/>
+                <a:ea typeface="ＭＳ Ｐゴシック" charset="-128"/>
+              </a:defRPr>
+            </a:lvl5pPr>
+            <a:lvl6pPr marL="457200" eaLnBrk="0" fontAlgn="base" hangingPunct="0">
+              <a:spcBef>
+                <a:spcPct val="0"/>
+              </a:spcBef>
+              <a:spcAft>
+                <a:spcPct val="0"/>
+              </a:spcAft>
+              <a:defRPr sz="2400">
+                <a:solidFill>
+                  <a:schemeClr val="tx1"/>
+                </a:solidFill>
+                <a:latin typeface="Arial" charset="0"/>
+                <a:ea typeface="ＭＳ Ｐゴシック" charset="-128"/>
+              </a:defRPr>
+            </a:lvl6pPr>
+            <a:lvl7pPr marL="914400" eaLnBrk="0" fontAlgn="base" hangingPunct="0">
+              <a:spcBef>
+                <a:spcPct val="0"/>
+              </a:spcBef>
+              <a:spcAft>
+                <a:spcPct val="0"/>
+              </a:spcAft>
+              <a:defRPr sz="2400">
+                <a:solidFill>
+                  <a:schemeClr val="tx1"/>
+                </a:solidFill>
+                <a:latin typeface="Arial" charset="0"/>
+                <a:ea typeface="ＭＳ Ｐゴシック" charset="-128"/>
+              </a:defRPr>
+            </a:lvl7pPr>
+            <a:lvl8pPr marL="1371600" eaLnBrk="0" fontAlgn="base" hangingPunct="0">
+              <a:spcBef>
+                <a:spcPct val="0"/>
+              </a:spcBef>
+              <a:spcAft>
+                <a:spcPct val="0"/>
+              </a:spcAft>
+              <a:defRPr sz="2400">
+                <a:solidFill>
+                  <a:schemeClr val="tx1"/>
+                </a:solidFill>
+                <a:latin typeface="Arial" charset="0"/>
+                <a:ea typeface="ＭＳ Ｐゴシック" charset="-128"/>
+              </a:defRPr>
+            </a:lvl8pPr>
+            <a:lvl9pPr marL="1828800" eaLnBrk="0" fontAlgn="base" hangingPunct="0">
+              <a:spcBef>
+                <a:spcPct val="0"/>
+              </a:spcBef>
+              <a:spcAft>
+                <a:spcPct val="0"/>
+              </a:spcAft>
+              <a:defRPr sz="2400">
+                <a:solidFill>
+                  <a:schemeClr val="tx1"/>
+                </a:solidFill>
+                <a:latin typeface="Arial" charset="0"/>
+                <a:ea typeface="ＭＳ Ｐゴシック" charset="-128"/>
+              </a:defRPr>
+            </a:lvl9pPr>
+          </a:lstStyle>
+          <a:p>
+            <a:pPr algn="ctr" eaLnBrk="1" hangingPunct="1"/>
+            <a:endParaRPr lang="en-US" altLang="en-US" sz="1800" dirty="0">
               <a:solidFill>
-                <a:schemeClr val="accent1"/>
+                <a:srgbClr val="000000"/>
               </a:solidFill>
-              <a:round/>
-              <a:headEnd/>
-              <a:tailEnd/>
-            </a:ln>
-            <a:effectLst>
-              <a:outerShdw dist="38100" dir="16200000" algn="tl" rotWithShape="0">
-                <a:schemeClr val="bg1">
-                  <a:alpha val="42998"/>
-                </a:schemeClr>
-              </a:outerShdw>
-            </a:effectLst>
-          </p:spPr>
-          <p:txBody>
-            <a:bodyPr anchor="ctr"/>
-            <a:lstStyle>
-              <a:lvl1pPr eaLnBrk="0" hangingPunct="0">
-                <a:defRPr sz="2400">
-                  <a:solidFill>
-                    <a:schemeClr val="tx1"/>
-                  </a:solidFill>
-                  <a:latin typeface="Arial" charset="0"/>
-                  <a:ea typeface="ＭＳ Ｐゴシック" charset="-128"/>
-                </a:defRPr>
-              </a:lvl1pPr>
-              <a:lvl2pPr marL="37931725" indent="-37474525" eaLnBrk="0" hangingPunct="0">
-                <a:defRPr sz="2400">
-                  <a:solidFill>
-                    <a:schemeClr val="tx1"/>
-                  </a:solidFill>
-                  <a:latin typeface="Arial" charset="0"/>
-                  <a:ea typeface="ＭＳ Ｐゴシック" charset="-128"/>
-                </a:defRPr>
-              </a:lvl2pPr>
-              <a:lvl3pPr eaLnBrk="0" hangingPunct="0">
-                <a:defRPr sz="2400">
-                  <a:solidFill>
-                    <a:schemeClr val="tx1"/>
-                  </a:solidFill>
-                  <a:latin typeface="Arial" charset="0"/>
-                  <a:ea typeface="ＭＳ Ｐゴシック" charset="-128"/>
-                </a:defRPr>
-              </a:lvl3pPr>
-              <a:lvl4pPr eaLnBrk="0" hangingPunct="0">
-                <a:defRPr sz="2400">
-                  <a:solidFill>
-                    <a:schemeClr val="tx1"/>
-                  </a:solidFill>
-                  <a:latin typeface="Arial" charset="0"/>
-                  <a:ea typeface="ＭＳ Ｐゴシック" charset="-128"/>
-                </a:defRPr>
-              </a:lvl4pPr>
-              <a:lvl5pPr eaLnBrk="0" hangingPunct="0">
-                <a:defRPr sz="2400">
-                  <a:solidFill>
-                    <a:schemeClr val="tx1"/>
-                  </a:solidFill>
-                  <a:latin typeface="Arial" charset="0"/>
-                  <a:ea typeface="ＭＳ Ｐゴシック" charset="-128"/>
-                </a:defRPr>
-              </a:lvl5pPr>
-              <a:lvl6pPr marL="457200" eaLnBrk="0" fontAlgn="base" hangingPunct="0">
-                <a:spcBef>
-                  <a:spcPct val="0"/>
-                </a:spcBef>
-                <a:spcAft>
-                  <a:spcPct val="0"/>
-                </a:spcAft>
-                <a:defRPr sz="2400">
-                  <a:solidFill>
-                    <a:schemeClr val="tx1"/>
-                  </a:solidFill>
-                  <a:latin typeface="Arial" charset="0"/>
-                  <a:ea typeface="ＭＳ Ｐゴシック" charset="-128"/>
-                </a:defRPr>
-              </a:lvl6pPr>
-              <a:lvl7pPr marL="914400" eaLnBrk="0" fontAlgn="base" hangingPunct="0">
-                <a:spcBef>
-                  <a:spcPct val="0"/>
-                </a:spcBef>
-                <a:spcAft>
-                  <a:spcPct val="0"/>
-                </a:spcAft>
-                <a:defRPr sz="2400">
-                  <a:solidFill>
-                    <a:schemeClr val="tx1"/>
-                  </a:solidFill>
-                  <a:latin typeface="Arial" charset="0"/>
-                  <a:ea typeface="ＭＳ Ｐゴシック" charset="-128"/>
-                </a:defRPr>
-              </a:lvl7pPr>
-              <a:lvl8pPr marL="1371600" eaLnBrk="0" fontAlgn="base" hangingPunct="0">
-                <a:spcBef>
-                  <a:spcPct val="0"/>
-                </a:spcBef>
-                <a:spcAft>
-                  <a:spcPct val="0"/>
-                </a:spcAft>
-                <a:defRPr sz="2400">
-                  <a:solidFill>
-                    <a:schemeClr val="tx1"/>
-                  </a:solidFill>
-                  <a:latin typeface="Arial" charset="0"/>
-                  <a:ea typeface="ＭＳ Ｐゴシック" charset="-128"/>
-                </a:defRPr>
-              </a:lvl8pPr>
-              <a:lvl9pPr marL="1828800" eaLnBrk="0" fontAlgn="base" hangingPunct="0">
-                <a:spcBef>
-                  <a:spcPct val="0"/>
-                </a:spcBef>
-                <a:spcAft>
-                  <a:spcPct val="0"/>
-                </a:spcAft>
-                <a:defRPr sz="2400">
-                  <a:solidFill>
-                    <a:schemeClr val="tx1"/>
-                  </a:solidFill>
-                  <a:latin typeface="Arial" charset="0"/>
-                  <a:ea typeface="ＭＳ Ｐゴシック" charset="-128"/>
-                </a:defRPr>
-              </a:lvl9pPr>
-            </a:lstStyle>
-            <a:p>
-              <a:pPr algn="ctr" eaLnBrk="1" hangingPunct="1"/>
-              <a:endParaRPr lang="en-US" altLang="en-US" sz="1800">
-                <a:solidFill>
-                  <a:srgbClr val="000000"/>
-                </a:solidFill>
-              </a:endParaRPr>
-            </a:p>
-          </p:txBody>
-        </p:sp>
-        <p:sp>
-          <p:nvSpPr>
-            <p:cNvPr id="9" name="Rounded Rectangle 8"/>
-            <p:cNvSpPr/>
-            <p:nvPr/>
-          </p:nvSpPr>
-          <p:spPr bwMode="auto">
-            <a:xfrm>
-              <a:off x="457200" y="4038600"/>
-              <a:ext cx="1368425" cy="609600"/>
-            </a:xfrm>
-            <a:prstGeom prst="roundRect">
-              <a:avLst/>
-            </a:prstGeom>
+            </a:endParaRPr>
+          </a:p>
+        </p:txBody>
+      </p:sp>
+      <p:sp>
+        <p:nvSpPr>
+          <p:cNvPr id="8" name="Rounded Rectangle 7"/>
+          <p:cNvSpPr>
+            <a:spLocks noChangeArrowheads="1"/>
+          </p:cNvSpPr>
+          <p:nvPr/>
+        </p:nvSpPr>
+        <p:spPr bwMode="auto">
+          <a:xfrm>
+            <a:off x="2132012" y="1216520"/>
+            <a:ext cx="4876800" cy="1143001"/>
+          </a:xfrm>
+          <a:prstGeom prst="roundRect">
+            <a:avLst>
+              <a:gd name="adj" fmla="val 17847"/>
+            </a:avLst>
+          </a:prstGeom>
+          <a:solidFill>
+            <a:schemeClr val="bg1"/>
+          </a:solidFill>
+          <a:ln w="101600">
             <a:solidFill>
               <a:schemeClr val="accent1"/>
             </a:solidFill>
-            <a:ln w="19050" cap="flat" cmpd="sng" algn="ctr">
+            <a:round/>
+            <a:headEnd/>
+            <a:tailEnd/>
+          </a:ln>
+          <a:effectLst/>
+        </p:spPr>
+        <p:txBody>
+          <a:bodyPr anchor="ctr"/>
+          <a:lstStyle>
+            <a:lvl1pPr eaLnBrk="0" hangingPunct="0">
+              <a:defRPr sz="2400">
+                <a:solidFill>
+                  <a:schemeClr val="tx1"/>
+                </a:solidFill>
+                <a:latin typeface="Arial" charset="0"/>
+                <a:ea typeface="ＭＳ Ｐゴシック" charset="-128"/>
+              </a:defRPr>
+            </a:lvl1pPr>
+            <a:lvl2pPr marL="37931725" indent="-37474525" eaLnBrk="0" hangingPunct="0">
+              <a:defRPr sz="2400">
+                <a:solidFill>
+                  <a:schemeClr val="tx1"/>
+                </a:solidFill>
+                <a:latin typeface="Arial" charset="0"/>
+                <a:ea typeface="ＭＳ Ｐゴシック" charset="-128"/>
+              </a:defRPr>
+            </a:lvl2pPr>
+            <a:lvl3pPr eaLnBrk="0" hangingPunct="0">
+              <a:defRPr sz="2400">
+                <a:solidFill>
+                  <a:schemeClr val="tx1"/>
+                </a:solidFill>
+                <a:latin typeface="Arial" charset="0"/>
+                <a:ea typeface="ＭＳ Ｐゴシック" charset="-128"/>
+              </a:defRPr>
+            </a:lvl3pPr>
+            <a:lvl4pPr eaLnBrk="0" hangingPunct="0">
+              <a:defRPr sz="2400">
+                <a:solidFill>
+                  <a:schemeClr val="tx1"/>
+                </a:solidFill>
+                <a:latin typeface="Arial" charset="0"/>
+                <a:ea typeface="ＭＳ Ｐゴシック" charset="-128"/>
+              </a:defRPr>
+            </a:lvl4pPr>
+            <a:lvl5pPr eaLnBrk="0" hangingPunct="0">
+              <a:defRPr sz="2400">
+                <a:solidFill>
+                  <a:schemeClr val="tx1"/>
+                </a:solidFill>
+                <a:latin typeface="Arial" charset="0"/>
+                <a:ea typeface="ＭＳ Ｐゴシック" charset="-128"/>
+              </a:defRPr>
+            </a:lvl5pPr>
+            <a:lvl6pPr marL="457200" eaLnBrk="0" fontAlgn="base" hangingPunct="0">
+              <a:spcBef>
+                <a:spcPct val="0"/>
+              </a:spcBef>
+              <a:spcAft>
+                <a:spcPct val="0"/>
+              </a:spcAft>
+              <a:defRPr sz="2400">
+                <a:solidFill>
+                  <a:schemeClr val="tx1"/>
+                </a:solidFill>
+                <a:latin typeface="Arial" charset="0"/>
+                <a:ea typeface="ＭＳ Ｐゴシック" charset="-128"/>
+              </a:defRPr>
+            </a:lvl6pPr>
+            <a:lvl7pPr marL="914400" eaLnBrk="0" fontAlgn="base" hangingPunct="0">
+              <a:spcBef>
+                <a:spcPct val="0"/>
+              </a:spcBef>
+              <a:spcAft>
+                <a:spcPct val="0"/>
+              </a:spcAft>
+              <a:defRPr sz="2400">
+                <a:solidFill>
+                  <a:schemeClr val="tx1"/>
+                </a:solidFill>
+                <a:latin typeface="Arial" charset="0"/>
+                <a:ea typeface="ＭＳ Ｐゴシック" charset="-128"/>
+              </a:defRPr>
+            </a:lvl7pPr>
+            <a:lvl8pPr marL="1371600" eaLnBrk="0" fontAlgn="base" hangingPunct="0">
+              <a:spcBef>
+                <a:spcPct val="0"/>
+              </a:spcBef>
+              <a:spcAft>
+                <a:spcPct val="0"/>
+              </a:spcAft>
+              <a:defRPr sz="2400">
+                <a:solidFill>
+                  <a:schemeClr val="tx1"/>
+                </a:solidFill>
+                <a:latin typeface="Arial" charset="0"/>
+                <a:ea typeface="ＭＳ Ｐゴシック" charset="-128"/>
+              </a:defRPr>
+            </a:lvl8pPr>
+            <a:lvl9pPr marL="1828800" eaLnBrk="0" fontAlgn="base" hangingPunct="0">
+              <a:spcBef>
+                <a:spcPct val="0"/>
+              </a:spcBef>
+              <a:spcAft>
+                <a:spcPct val="0"/>
+              </a:spcAft>
+              <a:defRPr sz="2400">
+                <a:solidFill>
+                  <a:schemeClr val="tx1"/>
+                </a:solidFill>
+                <a:latin typeface="Arial" charset="0"/>
+                <a:ea typeface="ＭＳ Ｐゴシック" charset="-128"/>
+              </a:defRPr>
+            </a:lvl9pPr>
+          </a:lstStyle>
+          <a:p>
+            <a:pPr algn="ctr" eaLnBrk="1" hangingPunct="1"/>
+            <a:endParaRPr lang="en-US" altLang="en-US" sz="1800" dirty="0">
               <a:solidFill>
-                <a:schemeClr val="bg1"/>
+                <a:srgbClr val="000000"/>
               </a:solidFill>
-              <a:prstDash val="solid"/>
-              <a:round/>
-              <a:headEnd type="none" w="med" len="med"/>
-              <a:tailEnd type="none" w="med" len="med"/>
-            </a:ln>
-            <a:effectLst/>
-          </p:spPr>
-          <p:style>
-            <a:lnRef idx="1">
-              <a:schemeClr val="accent1"/>
-            </a:lnRef>
-            <a:fillRef idx="3">
-              <a:schemeClr val="accent1"/>
-            </a:fillRef>
-            <a:effectRef idx="2">
-              <a:schemeClr val="accent1"/>
-            </a:effectRef>
-            <a:fontRef idx="minor">
-              <a:schemeClr val="lt1"/>
-            </a:fontRef>
-          </p:style>
-          <p:txBody>
-            <a:bodyPr anchor="ctr"/>
-            <a:lstStyle>
-              <a:lvl1pPr eaLnBrk="0" hangingPunct="0">
-                <a:defRPr sz="2400">
-                  <a:solidFill>
-                    <a:schemeClr val="tx1"/>
-                  </a:solidFill>
-                  <a:latin typeface="Arial" charset="0"/>
-                  <a:ea typeface="ＭＳ Ｐゴシック" charset="-128"/>
-                </a:defRPr>
-              </a:lvl1pPr>
-              <a:lvl2pPr marL="37931725" indent="-37474525" eaLnBrk="0" hangingPunct="0">
-                <a:defRPr sz="2400">
-                  <a:solidFill>
-                    <a:schemeClr val="tx1"/>
-                  </a:solidFill>
-                  <a:latin typeface="Arial" charset="0"/>
-                  <a:ea typeface="ＭＳ Ｐゴシック" charset="-128"/>
-                </a:defRPr>
-              </a:lvl2pPr>
-              <a:lvl3pPr eaLnBrk="0" hangingPunct="0">
-                <a:defRPr sz="2400">
-                  <a:solidFill>
-                    <a:schemeClr val="tx1"/>
-                  </a:solidFill>
-                  <a:latin typeface="Arial" charset="0"/>
-                  <a:ea typeface="ＭＳ Ｐゴシック" charset="-128"/>
-                </a:defRPr>
-              </a:lvl3pPr>
-              <a:lvl4pPr eaLnBrk="0" hangingPunct="0">
-                <a:defRPr sz="2400">
-                  <a:solidFill>
-                    <a:schemeClr val="tx1"/>
-                  </a:solidFill>
-                  <a:latin typeface="Arial" charset="0"/>
-                  <a:ea typeface="ＭＳ Ｐゴシック" charset="-128"/>
-                </a:defRPr>
-              </a:lvl4pPr>
-              <a:lvl5pPr eaLnBrk="0" hangingPunct="0">
-                <a:defRPr sz="2400">
-                  <a:solidFill>
-                    <a:schemeClr val="tx1"/>
-                  </a:solidFill>
-                  <a:latin typeface="Arial" charset="0"/>
-                  <a:ea typeface="ＭＳ Ｐゴシック" charset="-128"/>
-                </a:defRPr>
-              </a:lvl5pPr>
-              <a:lvl6pPr marL="457200" eaLnBrk="0" fontAlgn="base" hangingPunct="0">
-                <a:spcBef>
-                  <a:spcPct val="0"/>
-                </a:spcBef>
-                <a:spcAft>
-                  <a:spcPct val="0"/>
-                </a:spcAft>
-                <a:defRPr sz="2400">
-                  <a:solidFill>
-                    <a:schemeClr val="tx1"/>
-                  </a:solidFill>
-                  <a:latin typeface="Arial" charset="0"/>
-                  <a:ea typeface="ＭＳ Ｐゴシック" charset="-128"/>
-                </a:defRPr>
-              </a:lvl6pPr>
-              <a:lvl7pPr marL="914400" eaLnBrk="0" fontAlgn="base" hangingPunct="0">
-                <a:spcBef>
-                  <a:spcPct val="0"/>
-                </a:spcBef>
-                <a:spcAft>
-                  <a:spcPct val="0"/>
-                </a:spcAft>
-                <a:defRPr sz="2400">
-                  <a:solidFill>
-                    <a:schemeClr val="tx1"/>
-                  </a:solidFill>
-                  <a:latin typeface="Arial" charset="0"/>
-                  <a:ea typeface="ＭＳ Ｐゴシック" charset="-128"/>
-                </a:defRPr>
-              </a:lvl7pPr>
-              <a:lvl8pPr marL="1371600" eaLnBrk="0" fontAlgn="base" hangingPunct="0">
-                <a:spcBef>
-                  <a:spcPct val="0"/>
-                </a:spcBef>
-                <a:spcAft>
-                  <a:spcPct val="0"/>
-                </a:spcAft>
-                <a:defRPr sz="2400">
-                  <a:solidFill>
-                    <a:schemeClr val="tx1"/>
-                  </a:solidFill>
-                  <a:latin typeface="Arial" charset="0"/>
-                  <a:ea typeface="ＭＳ Ｐゴシック" charset="-128"/>
-                </a:defRPr>
-              </a:lvl8pPr>
-              <a:lvl9pPr marL="1828800" eaLnBrk="0" fontAlgn="base" hangingPunct="0">
-                <a:spcBef>
-                  <a:spcPct val="0"/>
-                </a:spcBef>
-                <a:spcAft>
-                  <a:spcPct val="0"/>
-                </a:spcAft>
-                <a:defRPr sz="2400">
-                  <a:solidFill>
-                    <a:schemeClr val="tx1"/>
-                  </a:solidFill>
-                  <a:latin typeface="Arial" charset="0"/>
-                  <a:ea typeface="ＭＳ Ｐゴシック" charset="-128"/>
-                </a:defRPr>
-              </a:lvl9pPr>
-            </a:lstStyle>
-            <a:p>
-              <a:pPr algn="ctr" eaLnBrk="1" hangingPunct="1"/>
-              <a:r>
-                <a:rPr lang="en-US" altLang="en-US" sz="1800">
-                  <a:solidFill>
-                    <a:srgbClr val="FFFFFF"/>
-                  </a:solidFill>
-                  <a:cs typeface="Arial" charset="0"/>
-                </a:rPr>
-                <a:t>initial demand</a:t>
-              </a:r>
-            </a:p>
-          </p:txBody>
-        </p:sp>
-        <p:sp>
-          <p:nvSpPr>
-            <p:cNvPr id="10" name="Rounded Rectangle 9"/>
-            <p:cNvSpPr/>
-            <p:nvPr/>
-          </p:nvSpPr>
-          <p:spPr bwMode="auto">
-            <a:xfrm>
-              <a:off x="7318375" y="4038600"/>
-              <a:ext cx="1368425" cy="609600"/>
-            </a:xfrm>
-            <a:prstGeom prst="roundRect">
-              <a:avLst/>
-            </a:prstGeom>
-            <a:solidFill>
-              <a:schemeClr val="accent1"/>
-            </a:solidFill>
-            <a:ln w="19050" cap="flat" cmpd="sng" algn="ctr">
-              <a:solidFill>
-                <a:schemeClr val="bg1"/>
-              </a:solidFill>
-              <a:prstDash val="solid"/>
-              <a:round/>
-              <a:headEnd type="none" w="med" len="med"/>
-              <a:tailEnd type="none" w="med" len="med"/>
-            </a:ln>
-            <a:effectLst/>
-          </p:spPr>
-          <p:style>
-            <a:lnRef idx="1">
-              <a:schemeClr val="accent1"/>
-            </a:lnRef>
-            <a:fillRef idx="3">
-              <a:schemeClr val="accent1"/>
-            </a:fillRef>
-            <a:effectRef idx="2">
-              <a:schemeClr val="accent1"/>
-            </a:effectRef>
-            <a:fontRef idx="minor">
-              <a:schemeClr val="lt1"/>
-            </a:fontRef>
-          </p:style>
-          <p:txBody>
-            <a:bodyPr anchor="ctr"/>
-            <a:lstStyle>
-              <a:lvl1pPr eaLnBrk="0" hangingPunct="0">
-                <a:defRPr sz="2400">
-                  <a:solidFill>
-                    <a:schemeClr val="tx1"/>
-                  </a:solidFill>
-                  <a:latin typeface="Arial" charset="0"/>
-                  <a:ea typeface="ＭＳ Ｐゴシック" charset="-128"/>
-                </a:defRPr>
-              </a:lvl1pPr>
-              <a:lvl2pPr marL="37931725" indent="-37474525" eaLnBrk="0" hangingPunct="0">
-                <a:defRPr sz="2400">
-                  <a:solidFill>
-                    <a:schemeClr val="tx1"/>
-                  </a:solidFill>
-                  <a:latin typeface="Arial" charset="0"/>
-                  <a:ea typeface="ＭＳ Ｐゴシック" charset="-128"/>
-                </a:defRPr>
-              </a:lvl2pPr>
-              <a:lvl3pPr eaLnBrk="0" hangingPunct="0">
-                <a:defRPr sz="2400">
-                  <a:solidFill>
-                    <a:schemeClr val="tx1"/>
-                  </a:solidFill>
-                  <a:latin typeface="Arial" charset="0"/>
-                  <a:ea typeface="ＭＳ Ｐゴシック" charset="-128"/>
-                </a:defRPr>
-              </a:lvl3pPr>
-              <a:lvl4pPr eaLnBrk="0" hangingPunct="0">
-                <a:defRPr sz="2400">
-                  <a:solidFill>
-                    <a:schemeClr val="tx1"/>
-                  </a:solidFill>
-                  <a:latin typeface="Arial" charset="0"/>
-                  <a:ea typeface="ＭＳ Ｐゴシック" charset="-128"/>
-                </a:defRPr>
-              </a:lvl4pPr>
-              <a:lvl5pPr eaLnBrk="0" hangingPunct="0">
-                <a:defRPr sz="2400">
-                  <a:solidFill>
-                    <a:schemeClr val="tx1"/>
-                  </a:solidFill>
-                  <a:latin typeface="Arial" charset="0"/>
-                  <a:ea typeface="ＭＳ Ｐゴシック" charset="-128"/>
-                </a:defRPr>
-              </a:lvl5pPr>
-              <a:lvl6pPr marL="457200" eaLnBrk="0" fontAlgn="base" hangingPunct="0">
-                <a:spcBef>
-                  <a:spcPct val="0"/>
-                </a:spcBef>
-                <a:spcAft>
-                  <a:spcPct val="0"/>
-                </a:spcAft>
-                <a:defRPr sz="2400">
-                  <a:solidFill>
-                    <a:schemeClr val="tx1"/>
-                  </a:solidFill>
-                  <a:latin typeface="Arial" charset="0"/>
-                  <a:ea typeface="ＭＳ Ｐゴシック" charset="-128"/>
-                </a:defRPr>
-              </a:lvl6pPr>
-              <a:lvl7pPr marL="914400" eaLnBrk="0" fontAlgn="base" hangingPunct="0">
-                <a:spcBef>
-                  <a:spcPct val="0"/>
-                </a:spcBef>
-                <a:spcAft>
-                  <a:spcPct val="0"/>
-                </a:spcAft>
-                <a:defRPr sz="2400">
-                  <a:solidFill>
-                    <a:schemeClr val="tx1"/>
-                  </a:solidFill>
-                  <a:latin typeface="Arial" charset="0"/>
-                  <a:ea typeface="ＭＳ Ｐゴシック" charset="-128"/>
-                </a:defRPr>
-              </a:lvl7pPr>
-              <a:lvl8pPr marL="1371600" eaLnBrk="0" fontAlgn="base" hangingPunct="0">
-                <a:spcBef>
-                  <a:spcPct val="0"/>
-                </a:spcBef>
-                <a:spcAft>
-                  <a:spcPct val="0"/>
-                </a:spcAft>
-                <a:defRPr sz="2400">
-                  <a:solidFill>
-                    <a:schemeClr val="tx1"/>
-                  </a:solidFill>
-                  <a:latin typeface="Arial" charset="0"/>
-                  <a:ea typeface="ＭＳ Ｐゴシック" charset="-128"/>
-                </a:defRPr>
-              </a:lvl8pPr>
-              <a:lvl9pPr marL="1828800" eaLnBrk="0" fontAlgn="base" hangingPunct="0">
-                <a:spcBef>
-                  <a:spcPct val="0"/>
-                </a:spcBef>
-                <a:spcAft>
-                  <a:spcPct val="0"/>
-                </a:spcAft>
-                <a:defRPr sz="2400">
-                  <a:solidFill>
-                    <a:schemeClr val="tx1"/>
-                  </a:solidFill>
-                  <a:latin typeface="Arial" charset="0"/>
-                  <a:ea typeface="ＭＳ Ｐゴシック" charset="-128"/>
-                </a:defRPr>
-              </a:lvl9pPr>
-            </a:lstStyle>
-            <a:p>
-              <a:pPr algn="ctr" eaLnBrk="1" hangingPunct="1"/>
-              <a:r>
-                <a:rPr lang="en-US" altLang="en-US" sz="1800">
-                  <a:solidFill>
-                    <a:srgbClr val="FFFFFF"/>
-                  </a:solidFill>
-                  <a:cs typeface="Arial" charset="0"/>
-                </a:rPr>
-                <a:t>analyses</a:t>
-              </a:r>
-            </a:p>
-          </p:txBody>
-        </p:sp>
-        <p:sp>
-          <p:nvSpPr>
-            <p:cNvPr id="11" name="Rounded Rectangle 10"/>
-            <p:cNvSpPr/>
-            <p:nvPr/>
-          </p:nvSpPr>
-          <p:spPr bwMode="auto">
-            <a:xfrm>
-              <a:off x="2517775" y="4038600"/>
-              <a:ext cx="1368425" cy="609600"/>
-            </a:xfrm>
-            <a:prstGeom prst="roundRect">
-              <a:avLst/>
-            </a:prstGeom>
-            <a:solidFill>
-              <a:schemeClr val="accent1"/>
-            </a:solidFill>
-            <a:ln w="19050" cap="flat" cmpd="sng" algn="ctr">
-              <a:solidFill>
-                <a:schemeClr val="bg1"/>
-              </a:solidFill>
-              <a:prstDash val="solid"/>
-              <a:round/>
-              <a:headEnd type="none" w="med" len="med"/>
-              <a:tailEnd type="none" w="med" len="med"/>
-            </a:ln>
-            <a:effectLst/>
-          </p:spPr>
-          <p:style>
-            <a:lnRef idx="1">
-              <a:schemeClr val="accent1"/>
-            </a:lnRef>
-            <a:fillRef idx="3">
-              <a:schemeClr val="accent1"/>
-            </a:fillRef>
-            <a:effectRef idx="2">
-              <a:schemeClr val="accent1"/>
-            </a:effectRef>
-            <a:fontRef idx="minor">
-              <a:schemeClr val="lt1"/>
-            </a:fontRef>
-          </p:style>
-          <p:txBody>
-            <a:bodyPr anchor="ctr"/>
-            <a:lstStyle>
-              <a:lvl1pPr eaLnBrk="0" hangingPunct="0">
-                <a:defRPr sz="2400">
-                  <a:solidFill>
-                    <a:schemeClr val="tx1"/>
-                  </a:solidFill>
-                  <a:latin typeface="Arial" charset="0"/>
-                  <a:ea typeface="ＭＳ Ｐゴシック" charset="-128"/>
-                </a:defRPr>
-              </a:lvl1pPr>
-              <a:lvl2pPr marL="37931725" indent="-37474525" eaLnBrk="0" hangingPunct="0">
-                <a:defRPr sz="2400">
-                  <a:solidFill>
-                    <a:schemeClr val="tx1"/>
-                  </a:solidFill>
-                  <a:latin typeface="Arial" charset="0"/>
-                  <a:ea typeface="ＭＳ Ｐゴシック" charset="-128"/>
-                </a:defRPr>
-              </a:lvl2pPr>
-              <a:lvl3pPr eaLnBrk="0" hangingPunct="0">
-                <a:defRPr sz="2400">
-                  <a:solidFill>
-                    <a:schemeClr val="tx1"/>
-                  </a:solidFill>
-                  <a:latin typeface="Arial" charset="0"/>
-                  <a:ea typeface="ＭＳ Ｐゴシック" charset="-128"/>
-                </a:defRPr>
-              </a:lvl3pPr>
-              <a:lvl4pPr eaLnBrk="0" hangingPunct="0">
-                <a:defRPr sz="2400">
-                  <a:solidFill>
-                    <a:schemeClr val="tx1"/>
-                  </a:solidFill>
-                  <a:latin typeface="Arial" charset="0"/>
-                  <a:ea typeface="ＭＳ Ｐゴシック" charset="-128"/>
-                </a:defRPr>
-              </a:lvl4pPr>
-              <a:lvl5pPr eaLnBrk="0" hangingPunct="0">
-                <a:defRPr sz="2400">
-                  <a:solidFill>
-                    <a:schemeClr val="tx1"/>
-                  </a:solidFill>
-                  <a:latin typeface="Arial" charset="0"/>
-                  <a:ea typeface="ＭＳ Ｐゴシック" charset="-128"/>
-                </a:defRPr>
-              </a:lvl5pPr>
-              <a:lvl6pPr marL="457200" eaLnBrk="0" fontAlgn="base" hangingPunct="0">
-                <a:spcBef>
-                  <a:spcPct val="0"/>
-                </a:spcBef>
-                <a:spcAft>
-                  <a:spcPct val="0"/>
-                </a:spcAft>
-                <a:defRPr sz="2400">
-                  <a:solidFill>
-                    <a:schemeClr val="tx1"/>
-                  </a:solidFill>
-                  <a:latin typeface="Arial" charset="0"/>
-                  <a:ea typeface="ＭＳ Ｐゴシック" charset="-128"/>
-                </a:defRPr>
-              </a:lvl6pPr>
-              <a:lvl7pPr marL="914400" eaLnBrk="0" fontAlgn="base" hangingPunct="0">
-                <a:spcBef>
-                  <a:spcPct val="0"/>
-                </a:spcBef>
-                <a:spcAft>
-                  <a:spcPct val="0"/>
-                </a:spcAft>
-                <a:defRPr sz="2400">
-                  <a:solidFill>
-                    <a:schemeClr val="tx1"/>
-                  </a:solidFill>
-                  <a:latin typeface="Arial" charset="0"/>
-                  <a:ea typeface="ＭＳ Ｐゴシック" charset="-128"/>
-                </a:defRPr>
-              </a:lvl7pPr>
-              <a:lvl8pPr marL="1371600" eaLnBrk="0" fontAlgn="base" hangingPunct="0">
-                <a:spcBef>
-                  <a:spcPct val="0"/>
-                </a:spcBef>
-                <a:spcAft>
-                  <a:spcPct val="0"/>
-                </a:spcAft>
-                <a:defRPr sz="2400">
-                  <a:solidFill>
-                    <a:schemeClr val="tx1"/>
-                  </a:solidFill>
-                  <a:latin typeface="Arial" charset="0"/>
-                  <a:ea typeface="ＭＳ Ｐゴシック" charset="-128"/>
-                </a:defRPr>
-              </a:lvl8pPr>
-              <a:lvl9pPr marL="1828800" eaLnBrk="0" fontAlgn="base" hangingPunct="0">
-                <a:spcBef>
-                  <a:spcPct val="0"/>
-                </a:spcBef>
-                <a:spcAft>
-                  <a:spcPct val="0"/>
-                </a:spcAft>
-                <a:defRPr sz="2400">
-                  <a:solidFill>
-                    <a:schemeClr val="tx1"/>
-                  </a:solidFill>
-                  <a:latin typeface="Arial" charset="0"/>
-                  <a:ea typeface="ＭＳ Ｐゴシック" charset="-128"/>
-                </a:defRPr>
-              </a:lvl9pPr>
-            </a:lstStyle>
-            <a:p>
-              <a:pPr algn="ctr" eaLnBrk="1" hangingPunct="1"/>
-              <a:r>
-                <a:rPr lang="en-US" altLang="en-US" sz="1800" smtClean="0">
-                  <a:solidFill>
-                    <a:srgbClr val="FFFFFF"/>
-                  </a:solidFill>
-                  <a:cs typeface="Arial" charset="0"/>
-                </a:rPr>
-                <a:t>mobsim</a:t>
-              </a:r>
-              <a:endParaRPr lang="en-US" altLang="en-US" sz="1800" dirty="0">
-                <a:solidFill>
-                  <a:srgbClr val="FFFFFF"/>
-                </a:solidFill>
-                <a:cs typeface="Arial" charset="0"/>
-              </a:endParaRPr>
-            </a:p>
-          </p:txBody>
-        </p:sp>
-        <p:sp>
-          <p:nvSpPr>
-            <p:cNvPr id="12" name="Rounded Rectangle 11"/>
-            <p:cNvSpPr/>
-            <p:nvPr/>
-          </p:nvSpPr>
-          <p:spPr bwMode="auto">
-            <a:xfrm>
-              <a:off x="5254625" y="4038600"/>
-              <a:ext cx="1366838" cy="609600"/>
-            </a:xfrm>
-            <a:prstGeom prst="roundRect">
-              <a:avLst/>
-            </a:prstGeom>
-            <a:solidFill>
-              <a:schemeClr val="accent1"/>
-            </a:solidFill>
-            <a:ln w="19050" cap="flat" cmpd="sng" algn="ctr">
-              <a:solidFill>
-                <a:schemeClr val="bg1"/>
-              </a:solidFill>
-              <a:prstDash val="solid"/>
-              <a:round/>
-              <a:headEnd type="none" w="med" len="med"/>
-              <a:tailEnd type="none" w="med" len="med"/>
-            </a:ln>
-            <a:effectLst/>
-          </p:spPr>
-          <p:style>
-            <a:lnRef idx="1">
-              <a:schemeClr val="accent1"/>
-            </a:lnRef>
-            <a:fillRef idx="3">
-              <a:schemeClr val="accent1"/>
-            </a:fillRef>
-            <a:effectRef idx="2">
-              <a:schemeClr val="accent1"/>
-            </a:effectRef>
-            <a:fontRef idx="minor">
-              <a:schemeClr val="lt1"/>
-            </a:fontRef>
-          </p:style>
-          <p:txBody>
-            <a:bodyPr anchor="ctr"/>
-            <a:lstStyle>
-              <a:lvl1pPr eaLnBrk="0" hangingPunct="0">
-                <a:defRPr sz="2400">
-                  <a:solidFill>
-                    <a:schemeClr val="tx1"/>
-                  </a:solidFill>
-                  <a:latin typeface="Arial" charset="0"/>
-                  <a:ea typeface="ＭＳ Ｐゴシック" charset="-128"/>
-                </a:defRPr>
-              </a:lvl1pPr>
-              <a:lvl2pPr marL="37931725" indent="-37474525" eaLnBrk="0" hangingPunct="0">
-                <a:defRPr sz="2400">
-                  <a:solidFill>
-                    <a:schemeClr val="tx1"/>
-                  </a:solidFill>
-                  <a:latin typeface="Arial" charset="0"/>
-                  <a:ea typeface="ＭＳ Ｐゴシック" charset="-128"/>
-                </a:defRPr>
-              </a:lvl2pPr>
-              <a:lvl3pPr eaLnBrk="0" hangingPunct="0">
-                <a:defRPr sz="2400">
-                  <a:solidFill>
-                    <a:schemeClr val="tx1"/>
-                  </a:solidFill>
-                  <a:latin typeface="Arial" charset="0"/>
-                  <a:ea typeface="ＭＳ Ｐゴシック" charset="-128"/>
-                </a:defRPr>
-              </a:lvl3pPr>
-              <a:lvl4pPr eaLnBrk="0" hangingPunct="0">
-                <a:defRPr sz="2400">
-                  <a:solidFill>
-                    <a:schemeClr val="tx1"/>
-                  </a:solidFill>
-                  <a:latin typeface="Arial" charset="0"/>
-                  <a:ea typeface="ＭＳ Ｐゴシック" charset="-128"/>
-                </a:defRPr>
-              </a:lvl4pPr>
-              <a:lvl5pPr eaLnBrk="0" hangingPunct="0">
-                <a:defRPr sz="2400">
-                  <a:solidFill>
-                    <a:schemeClr val="tx1"/>
-                  </a:solidFill>
-                  <a:latin typeface="Arial" charset="0"/>
-                  <a:ea typeface="ＭＳ Ｐゴシック" charset="-128"/>
-                </a:defRPr>
-              </a:lvl5pPr>
-              <a:lvl6pPr marL="457200" eaLnBrk="0" fontAlgn="base" hangingPunct="0">
-                <a:spcBef>
-                  <a:spcPct val="0"/>
-                </a:spcBef>
-                <a:spcAft>
-                  <a:spcPct val="0"/>
-                </a:spcAft>
-                <a:defRPr sz="2400">
-                  <a:solidFill>
-                    <a:schemeClr val="tx1"/>
-                  </a:solidFill>
-                  <a:latin typeface="Arial" charset="0"/>
-                  <a:ea typeface="ＭＳ Ｐゴシック" charset="-128"/>
-                </a:defRPr>
-              </a:lvl6pPr>
-              <a:lvl7pPr marL="914400" eaLnBrk="0" fontAlgn="base" hangingPunct="0">
-                <a:spcBef>
-                  <a:spcPct val="0"/>
-                </a:spcBef>
-                <a:spcAft>
-                  <a:spcPct val="0"/>
-                </a:spcAft>
-                <a:defRPr sz="2400">
-                  <a:solidFill>
-                    <a:schemeClr val="tx1"/>
-                  </a:solidFill>
-                  <a:latin typeface="Arial" charset="0"/>
-                  <a:ea typeface="ＭＳ Ｐゴシック" charset="-128"/>
-                </a:defRPr>
-              </a:lvl7pPr>
-              <a:lvl8pPr marL="1371600" eaLnBrk="0" fontAlgn="base" hangingPunct="0">
-                <a:spcBef>
-                  <a:spcPct val="0"/>
-                </a:spcBef>
-                <a:spcAft>
-                  <a:spcPct val="0"/>
-                </a:spcAft>
-                <a:defRPr sz="2400">
-                  <a:solidFill>
-                    <a:schemeClr val="tx1"/>
-                  </a:solidFill>
-                  <a:latin typeface="Arial" charset="0"/>
-                  <a:ea typeface="ＭＳ Ｐゴシック" charset="-128"/>
-                </a:defRPr>
-              </a:lvl8pPr>
-              <a:lvl9pPr marL="1828800" eaLnBrk="0" fontAlgn="base" hangingPunct="0">
-                <a:spcBef>
-                  <a:spcPct val="0"/>
-                </a:spcBef>
-                <a:spcAft>
-                  <a:spcPct val="0"/>
-                </a:spcAft>
-                <a:defRPr sz="2400">
-                  <a:solidFill>
-                    <a:schemeClr val="tx1"/>
-                  </a:solidFill>
-                  <a:latin typeface="Arial" charset="0"/>
-                  <a:ea typeface="ＭＳ Ｐゴシック" charset="-128"/>
-                </a:defRPr>
-              </a:lvl9pPr>
-            </a:lstStyle>
-            <a:p>
-              <a:pPr algn="ctr" eaLnBrk="1" hangingPunct="1"/>
-              <a:r>
-                <a:rPr lang="en-US" altLang="en-US" sz="1800">
-                  <a:solidFill>
-                    <a:srgbClr val="FFFFFF"/>
-                  </a:solidFill>
-                  <a:cs typeface="Arial" charset="0"/>
-                </a:rPr>
-                <a:t>scoring</a:t>
-              </a:r>
-            </a:p>
-          </p:txBody>
-        </p:sp>
-        <p:sp>
-          <p:nvSpPr>
-            <p:cNvPr id="13" name="Rounded Rectangle 12"/>
-            <p:cNvSpPr/>
-            <p:nvPr/>
-          </p:nvSpPr>
-          <p:spPr bwMode="auto">
-            <a:xfrm>
-              <a:off x="3886200" y="5181600"/>
-              <a:ext cx="1368425" cy="609600"/>
-            </a:xfrm>
-            <a:prstGeom prst="roundRect">
-              <a:avLst/>
-            </a:prstGeom>
-            <a:solidFill>
-              <a:schemeClr val="accent1"/>
-            </a:solidFill>
-            <a:ln w="19050" cap="flat" cmpd="sng" algn="ctr">
-              <a:solidFill>
-                <a:schemeClr val="bg1"/>
-              </a:solidFill>
-              <a:prstDash val="solid"/>
-              <a:round/>
-              <a:headEnd type="none" w="med" len="med"/>
-              <a:tailEnd type="none" w="med" len="med"/>
-            </a:ln>
-            <a:effectLst/>
-          </p:spPr>
-          <p:style>
-            <a:lnRef idx="1">
-              <a:schemeClr val="accent1"/>
-            </a:lnRef>
-            <a:fillRef idx="3">
-              <a:schemeClr val="accent1"/>
-            </a:fillRef>
-            <a:effectRef idx="2">
-              <a:schemeClr val="accent1"/>
-            </a:effectRef>
-            <a:fontRef idx="minor">
-              <a:schemeClr val="lt1"/>
-            </a:fontRef>
-          </p:style>
-          <p:txBody>
-            <a:bodyPr anchor="ctr"/>
-            <a:lstStyle>
-              <a:lvl1pPr eaLnBrk="0" hangingPunct="0">
-                <a:defRPr sz="2400">
-                  <a:solidFill>
-                    <a:schemeClr val="tx1"/>
-                  </a:solidFill>
-                  <a:latin typeface="Arial" charset="0"/>
-                  <a:ea typeface="ＭＳ Ｐゴシック" charset="-128"/>
-                </a:defRPr>
-              </a:lvl1pPr>
-              <a:lvl2pPr marL="37931725" indent="-37474525" eaLnBrk="0" hangingPunct="0">
-                <a:defRPr sz="2400">
-                  <a:solidFill>
-                    <a:schemeClr val="tx1"/>
-                  </a:solidFill>
-                  <a:latin typeface="Arial" charset="0"/>
-                  <a:ea typeface="ＭＳ Ｐゴシック" charset="-128"/>
-                </a:defRPr>
-              </a:lvl2pPr>
-              <a:lvl3pPr eaLnBrk="0" hangingPunct="0">
-                <a:defRPr sz="2400">
-                  <a:solidFill>
-                    <a:schemeClr val="tx1"/>
-                  </a:solidFill>
-                  <a:latin typeface="Arial" charset="0"/>
-                  <a:ea typeface="ＭＳ Ｐゴシック" charset="-128"/>
-                </a:defRPr>
-              </a:lvl3pPr>
-              <a:lvl4pPr eaLnBrk="0" hangingPunct="0">
-                <a:defRPr sz="2400">
-                  <a:solidFill>
-                    <a:schemeClr val="tx1"/>
-                  </a:solidFill>
-                  <a:latin typeface="Arial" charset="0"/>
-                  <a:ea typeface="ＭＳ Ｐゴシック" charset="-128"/>
-                </a:defRPr>
-              </a:lvl4pPr>
-              <a:lvl5pPr eaLnBrk="0" hangingPunct="0">
-                <a:defRPr sz="2400">
-                  <a:solidFill>
-                    <a:schemeClr val="tx1"/>
-                  </a:solidFill>
-                  <a:latin typeface="Arial" charset="0"/>
-                  <a:ea typeface="ＭＳ Ｐゴシック" charset="-128"/>
-                </a:defRPr>
-              </a:lvl5pPr>
-              <a:lvl6pPr marL="457200" eaLnBrk="0" fontAlgn="base" hangingPunct="0">
-                <a:spcBef>
-                  <a:spcPct val="0"/>
-                </a:spcBef>
-                <a:spcAft>
-                  <a:spcPct val="0"/>
-                </a:spcAft>
-                <a:defRPr sz="2400">
-                  <a:solidFill>
-                    <a:schemeClr val="tx1"/>
-                  </a:solidFill>
-                  <a:latin typeface="Arial" charset="0"/>
-                  <a:ea typeface="ＭＳ Ｐゴシック" charset="-128"/>
-                </a:defRPr>
-              </a:lvl6pPr>
-              <a:lvl7pPr marL="914400" eaLnBrk="0" fontAlgn="base" hangingPunct="0">
-                <a:spcBef>
-                  <a:spcPct val="0"/>
-                </a:spcBef>
-                <a:spcAft>
-                  <a:spcPct val="0"/>
-                </a:spcAft>
-                <a:defRPr sz="2400">
-                  <a:solidFill>
-                    <a:schemeClr val="tx1"/>
-                  </a:solidFill>
-                  <a:latin typeface="Arial" charset="0"/>
-                  <a:ea typeface="ＭＳ Ｐゴシック" charset="-128"/>
-                </a:defRPr>
-              </a:lvl7pPr>
-              <a:lvl8pPr marL="1371600" eaLnBrk="0" fontAlgn="base" hangingPunct="0">
-                <a:spcBef>
-                  <a:spcPct val="0"/>
-                </a:spcBef>
-                <a:spcAft>
-                  <a:spcPct val="0"/>
-                </a:spcAft>
-                <a:defRPr sz="2400">
-                  <a:solidFill>
-                    <a:schemeClr val="tx1"/>
-                  </a:solidFill>
-                  <a:latin typeface="Arial" charset="0"/>
-                  <a:ea typeface="ＭＳ Ｐゴシック" charset="-128"/>
-                </a:defRPr>
-              </a:lvl8pPr>
-              <a:lvl9pPr marL="1828800" eaLnBrk="0" fontAlgn="base" hangingPunct="0">
-                <a:spcBef>
-                  <a:spcPct val="0"/>
-                </a:spcBef>
-                <a:spcAft>
-                  <a:spcPct val="0"/>
-                </a:spcAft>
-                <a:defRPr sz="2400">
-                  <a:solidFill>
-                    <a:schemeClr val="tx1"/>
-                  </a:solidFill>
-                  <a:latin typeface="Arial" charset="0"/>
-                  <a:ea typeface="ＭＳ Ｐゴシック" charset="-128"/>
-                </a:defRPr>
-              </a:lvl9pPr>
-            </a:lstStyle>
-            <a:p>
-              <a:pPr algn="ctr" eaLnBrk="1" hangingPunct="1"/>
-              <a:r>
-                <a:rPr lang="en-US" altLang="en-US" sz="1800">
-                  <a:solidFill>
-                    <a:srgbClr val="FFFFFF"/>
-                  </a:solidFill>
-                  <a:cs typeface="Arial" charset="0"/>
-                </a:rPr>
-                <a:t>replanning</a:t>
-              </a:r>
-            </a:p>
-          </p:txBody>
-        </p:sp>
-        <p:sp>
-          <p:nvSpPr>
-            <p:cNvPr id="14" name="L-Shape 13"/>
-            <p:cNvSpPr/>
-            <p:nvPr/>
-          </p:nvSpPr>
-          <p:spPr bwMode="auto">
-            <a:xfrm rot="13500000">
-              <a:off x="4443413" y="4289425"/>
-              <a:ext cx="115888" cy="115887"/>
-            </a:xfrm>
-            <a:prstGeom prst="corner">
-              <a:avLst>
-                <a:gd name="adj1" fmla="val 15044"/>
-                <a:gd name="adj2" fmla="val 14015"/>
-              </a:avLst>
-            </a:prstGeom>
+            </a:endParaRPr>
+          </a:p>
+        </p:txBody>
+      </p:sp>
+      <p:sp>
+        <p:nvSpPr>
+          <p:cNvPr id="9" name="Rounded Rectangle 8"/>
+          <p:cNvSpPr/>
+          <p:nvPr/>
+        </p:nvSpPr>
+        <p:spPr bwMode="auto">
+          <a:xfrm>
+            <a:off x="455612" y="911720"/>
+            <a:ext cx="1368425" cy="609600"/>
+          </a:xfrm>
+          <a:prstGeom prst="roundRect">
+            <a:avLst/>
+          </a:prstGeom>
+          <a:solidFill>
+            <a:schemeClr val="accent1"/>
+          </a:solidFill>
+          <a:ln w="19050" cap="flat" cmpd="sng" algn="ctr">
             <a:solidFill>
               <a:schemeClr val="bg1"/>
             </a:solidFill>
-            <a:ln>
-              <a:solidFill>
-                <a:schemeClr val="bg1"/>
-              </a:solidFill>
-            </a:ln>
-            <a:effectLst/>
-          </p:spPr>
-          <p:style>
-            <a:lnRef idx="1">
-              <a:schemeClr val="accent1"/>
-            </a:lnRef>
-            <a:fillRef idx="3">
-              <a:schemeClr val="accent1"/>
-            </a:fillRef>
-            <a:effectRef idx="2">
-              <a:schemeClr val="accent1"/>
-            </a:effectRef>
-            <a:fontRef idx="minor">
-              <a:schemeClr val="lt1"/>
-            </a:fontRef>
-          </p:style>
-          <p:txBody>
-            <a:bodyPr anchor="ctr"/>
-            <a:lstStyle>
-              <a:lvl1pPr eaLnBrk="0" hangingPunct="0">
-                <a:defRPr sz="2400">
-                  <a:solidFill>
-                    <a:schemeClr val="tx1"/>
-                  </a:solidFill>
-                  <a:latin typeface="Arial" charset="0"/>
-                  <a:ea typeface="ＭＳ Ｐゴシック" charset="-128"/>
-                </a:defRPr>
-              </a:lvl1pPr>
-              <a:lvl2pPr marL="37931725" indent="-37474525" eaLnBrk="0" hangingPunct="0">
-                <a:defRPr sz="2400">
-                  <a:solidFill>
-                    <a:schemeClr val="tx1"/>
-                  </a:solidFill>
-                  <a:latin typeface="Arial" charset="0"/>
-                  <a:ea typeface="ＭＳ Ｐゴシック" charset="-128"/>
-                </a:defRPr>
-              </a:lvl2pPr>
-              <a:lvl3pPr eaLnBrk="0" hangingPunct="0">
-                <a:defRPr sz="2400">
-                  <a:solidFill>
-                    <a:schemeClr val="tx1"/>
-                  </a:solidFill>
-                  <a:latin typeface="Arial" charset="0"/>
-                  <a:ea typeface="ＭＳ Ｐゴシック" charset="-128"/>
-                </a:defRPr>
-              </a:lvl3pPr>
-              <a:lvl4pPr eaLnBrk="0" hangingPunct="0">
-                <a:defRPr sz="2400">
-                  <a:solidFill>
-                    <a:schemeClr val="tx1"/>
-                  </a:solidFill>
-                  <a:latin typeface="Arial" charset="0"/>
-                  <a:ea typeface="ＭＳ Ｐゴシック" charset="-128"/>
-                </a:defRPr>
-              </a:lvl4pPr>
-              <a:lvl5pPr eaLnBrk="0" hangingPunct="0">
-                <a:defRPr sz="2400">
-                  <a:solidFill>
-                    <a:schemeClr val="tx1"/>
-                  </a:solidFill>
-                  <a:latin typeface="Arial" charset="0"/>
-                  <a:ea typeface="ＭＳ Ｐゴシック" charset="-128"/>
-                </a:defRPr>
-              </a:lvl5pPr>
-              <a:lvl6pPr marL="457200" eaLnBrk="0" fontAlgn="base" hangingPunct="0">
-                <a:spcBef>
-                  <a:spcPct val="0"/>
-                </a:spcBef>
-                <a:spcAft>
-                  <a:spcPct val="0"/>
-                </a:spcAft>
-                <a:defRPr sz="2400">
-                  <a:solidFill>
-                    <a:schemeClr val="tx1"/>
-                  </a:solidFill>
-                  <a:latin typeface="Arial" charset="0"/>
-                  <a:ea typeface="ＭＳ Ｐゴシック" charset="-128"/>
-                </a:defRPr>
-              </a:lvl6pPr>
-              <a:lvl7pPr marL="914400" eaLnBrk="0" fontAlgn="base" hangingPunct="0">
-                <a:spcBef>
-                  <a:spcPct val="0"/>
-                </a:spcBef>
-                <a:spcAft>
-                  <a:spcPct val="0"/>
-                </a:spcAft>
-                <a:defRPr sz="2400">
-                  <a:solidFill>
-                    <a:schemeClr val="tx1"/>
-                  </a:solidFill>
-                  <a:latin typeface="Arial" charset="0"/>
-                  <a:ea typeface="ＭＳ Ｐゴシック" charset="-128"/>
-                </a:defRPr>
-              </a:lvl7pPr>
-              <a:lvl8pPr marL="1371600" eaLnBrk="0" fontAlgn="base" hangingPunct="0">
-                <a:spcBef>
-                  <a:spcPct val="0"/>
-                </a:spcBef>
-                <a:spcAft>
-                  <a:spcPct val="0"/>
-                </a:spcAft>
-                <a:defRPr sz="2400">
-                  <a:solidFill>
-                    <a:schemeClr val="tx1"/>
-                  </a:solidFill>
-                  <a:latin typeface="Arial" charset="0"/>
-                  <a:ea typeface="ＭＳ Ｐゴシック" charset="-128"/>
-                </a:defRPr>
-              </a:lvl8pPr>
-              <a:lvl9pPr marL="1828800" eaLnBrk="0" fontAlgn="base" hangingPunct="0">
-                <a:spcBef>
-                  <a:spcPct val="0"/>
-                </a:spcBef>
-                <a:spcAft>
-                  <a:spcPct val="0"/>
-                </a:spcAft>
-                <a:defRPr sz="2400">
-                  <a:solidFill>
-                    <a:schemeClr val="tx1"/>
-                  </a:solidFill>
-                  <a:latin typeface="Arial" charset="0"/>
-                  <a:ea typeface="ＭＳ Ｐゴシック" charset="-128"/>
-                </a:defRPr>
-              </a:lvl9pPr>
-            </a:lstStyle>
-            <a:p>
-              <a:pPr algn="ctr" eaLnBrk="1" hangingPunct="1"/>
-              <a:endParaRPr lang="en-US" altLang="en-US" sz="1800">
+            <a:prstDash val="solid"/>
+            <a:round/>
+            <a:headEnd type="none" w="med" len="med"/>
+            <a:tailEnd type="none" w="med" len="med"/>
+          </a:ln>
+          <a:effectLst/>
+        </p:spPr>
+        <p:style>
+          <a:lnRef idx="1">
+            <a:schemeClr val="accent1"/>
+          </a:lnRef>
+          <a:fillRef idx="3">
+            <a:schemeClr val="accent1"/>
+          </a:fillRef>
+          <a:effectRef idx="2">
+            <a:schemeClr val="accent1"/>
+          </a:effectRef>
+          <a:fontRef idx="minor">
+            <a:schemeClr val="lt1"/>
+          </a:fontRef>
+        </p:style>
+        <p:txBody>
+          <a:bodyPr anchor="ctr"/>
+          <a:lstStyle>
+            <a:lvl1pPr eaLnBrk="0" hangingPunct="0">
+              <a:defRPr sz="2400">
+                <a:solidFill>
+                  <a:schemeClr val="tx1"/>
+                </a:solidFill>
+                <a:latin typeface="Arial" charset="0"/>
+                <a:ea typeface="ＭＳ Ｐゴシック" charset="-128"/>
+              </a:defRPr>
+            </a:lvl1pPr>
+            <a:lvl2pPr marL="37931725" indent="-37474525" eaLnBrk="0" hangingPunct="0">
+              <a:defRPr sz="2400">
+                <a:solidFill>
+                  <a:schemeClr val="tx1"/>
+                </a:solidFill>
+                <a:latin typeface="Arial" charset="0"/>
+                <a:ea typeface="ＭＳ Ｐゴシック" charset="-128"/>
+              </a:defRPr>
+            </a:lvl2pPr>
+            <a:lvl3pPr eaLnBrk="0" hangingPunct="0">
+              <a:defRPr sz="2400">
+                <a:solidFill>
+                  <a:schemeClr val="tx1"/>
+                </a:solidFill>
+                <a:latin typeface="Arial" charset="0"/>
+                <a:ea typeface="ＭＳ Ｐゴシック" charset="-128"/>
+              </a:defRPr>
+            </a:lvl3pPr>
+            <a:lvl4pPr eaLnBrk="0" hangingPunct="0">
+              <a:defRPr sz="2400">
+                <a:solidFill>
+                  <a:schemeClr val="tx1"/>
+                </a:solidFill>
+                <a:latin typeface="Arial" charset="0"/>
+                <a:ea typeface="ＭＳ Ｐゴシック" charset="-128"/>
+              </a:defRPr>
+            </a:lvl4pPr>
+            <a:lvl5pPr eaLnBrk="0" hangingPunct="0">
+              <a:defRPr sz="2400">
+                <a:solidFill>
+                  <a:schemeClr val="tx1"/>
+                </a:solidFill>
+                <a:latin typeface="Arial" charset="0"/>
+                <a:ea typeface="ＭＳ Ｐゴシック" charset="-128"/>
+              </a:defRPr>
+            </a:lvl5pPr>
+            <a:lvl6pPr marL="457200" eaLnBrk="0" fontAlgn="base" hangingPunct="0">
+              <a:spcBef>
+                <a:spcPct val="0"/>
+              </a:spcBef>
+              <a:spcAft>
+                <a:spcPct val="0"/>
+              </a:spcAft>
+              <a:defRPr sz="2400">
+                <a:solidFill>
+                  <a:schemeClr val="tx1"/>
+                </a:solidFill>
+                <a:latin typeface="Arial" charset="0"/>
+                <a:ea typeface="ＭＳ Ｐゴシック" charset="-128"/>
+              </a:defRPr>
+            </a:lvl6pPr>
+            <a:lvl7pPr marL="914400" eaLnBrk="0" fontAlgn="base" hangingPunct="0">
+              <a:spcBef>
+                <a:spcPct val="0"/>
+              </a:spcBef>
+              <a:spcAft>
+                <a:spcPct val="0"/>
+              </a:spcAft>
+              <a:defRPr sz="2400">
+                <a:solidFill>
+                  <a:schemeClr val="tx1"/>
+                </a:solidFill>
+                <a:latin typeface="Arial" charset="0"/>
+                <a:ea typeface="ＭＳ Ｐゴシック" charset="-128"/>
+              </a:defRPr>
+            </a:lvl7pPr>
+            <a:lvl8pPr marL="1371600" eaLnBrk="0" fontAlgn="base" hangingPunct="0">
+              <a:spcBef>
+                <a:spcPct val="0"/>
+              </a:spcBef>
+              <a:spcAft>
+                <a:spcPct val="0"/>
+              </a:spcAft>
+              <a:defRPr sz="2400">
+                <a:solidFill>
+                  <a:schemeClr val="tx1"/>
+                </a:solidFill>
+                <a:latin typeface="Arial" charset="0"/>
+                <a:ea typeface="ＭＳ Ｐゴシック" charset="-128"/>
+              </a:defRPr>
+            </a:lvl8pPr>
+            <a:lvl9pPr marL="1828800" eaLnBrk="0" fontAlgn="base" hangingPunct="0">
+              <a:spcBef>
+                <a:spcPct val="0"/>
+              </a:spcBef>
+              <a:spcAft>
+                <a:spcPct val="0"/>
+              </a:spcAft>
+              <a:defRPr sz="2400">
+                <a:solidFill>
+                  <a:schemeClr val="tx1"/>
+                </a:solidFill>
+                <a:latin typeface="Arial" charset="0"/>
+                <a:ea typeface="ＭＳ Ｐゴシック" charset="-128"/>
+              </a:defRPr>
+            </a:lvl9pPr>
+          </a:lstStyle>
+          <a:p>
+            <a:pPr algn="ctr" eaLnBrk="1" hangingPunct="1"/>
+            <a:r>
+              <a:rPr lang="en-US" altLang="en-US" sz="1800">
                 <a:solidFill>
                   <a:srgbClr val="FFFFFF"/>
                 </a:solidFill>
-              </a:endParaRPr>
-            </a:p>
-          </p:txBody>
-        </p:sp>
-        <p:sp>
-          <p:nvSpPr>
-            <p:cNvPr id="15" name="L-Shape 14"/>
-            <p:cNvSpPr/>
-            <p:nvPr/>
-          </p:nvSpPr>
-          <p:spPr bwMode="auto">
-            <a:xfrm rot="13500000">
-              <a:off x="7034213" y="4289425"/>
-              <a:ext cx="115888" cy="115887"/>
-            </a:xfrm>
-            <a:prstGeom prst="corner">
-              <a:avLst>
-                <a:gd name="adj1" fmla="val 15044"/>
-                <a:gd name="adj2" fmla="val 14015"/>
-              </a:avLst>
-            </a:prstGeom>
+                <a:cs typeface="Arial" charset="0"/>
+              </a:rPr>
+              <a:t>initial demand</a:t>
+            </a:r>
+          </a:p>
+        </p:txBody>
+      </p:sp>
+      <p:sp>
+        <p:nvSpPr>
+          <p:cNvPr id="10" name="Rounded Rectangle 9"/>
+          <p:cNvSpPr/>
+          <p:nvPr/>
+        </p:nvSpPr>
+        <p:spPr bwMode="auto">
+          <a:xfrm>
+            <a:off x="7316787" y="911720"/>
+            <a:ext cx="1368425" cy="609600"/>
+          </a:xfrm>
+          <a:prstGeom prst="roundRect">
+            <a:avLst/>
+          </a:prstGeom>
+          <a:solidFill>
+            <a:schemeClr val="accent1"/>
+          </a:solidFill>
+          <a:ln w="19050" cap="flat" cmpd="sng" algn="ctr">
             <a:solidFill>
               <a:schemeClr val="bg1"/>
             </a:solidFill>
-            <a:ln>
-              <a:solidFill>
-                <a:schemeClr val="bg1"/>
-              </a:solidFill>
-            </a:ln>
-            <a:effectLst/>
-          </p:spPr>
-          <p:style>
-            <a:lnRef idx="1">
-              <a:schemeClr val="accent1"/>
-            </a:lnRef>
-            <a:fillRef idx="3">
-              <a:schemeClr val="accent1"/>
-            </a:fillRef>
-            <a:effectRef idx="2">
-              <a:schemeClr val="accent1"/>
-            </a:effectRef>
-            <a:fontRef idx="minor">
-              <a:schemeClr val="lt1"/>
-            </a:fontRef>
-          </p:style>
-          <p:txBody>
-            <a:bodyPr anchor="ctr"/>
-            <a:lstStyle>
-              <a:lvl1pPr eaLnBrk="0" hangingPunct="0">
-                <a:defRPr sz="2400">
-                  <a:solidFill>
-                    <a:schemeClr val="tx1"/>
-                  </a:solidFill>
-                  <a:latin typeface="Arial" charset="0"/>
-                  <a:ea typeface="ＭＳ Ｐゴシック" charset="-128"/>
-                </a:defRPr>
-              </a:lvl1pPr>
-              <a:lvl2pPr marL="37931725" indent="-37474525" eaLnBrk="0" hangingPunct="0">
-                <a:defRPr sz="2400">
-                  <a:solidFill>
-                    <a:schemeClr val="tx1"/>
-                  </a:solidFill>
-                  <a:latin typeface="Arial" charset="0"/>
-                  <a:ea typeface="ＭＳ Ｐゴシック" charset="-128"/>
-                </a:defRPr>
-              </a:lvl2pPr>
-              <a:lvl3pPr eaLnBrk="0" hangingPunct="0">
-                <a:defRPr sz="2400">
-                  <a:solidFill>
-                    <a:schemeClr val="tx1"/>
-                  </a:solidFill>
-                  <a:latin typeface="Arial" charset="0"/>
-                  <a:ea typeface="ＭＳ Ｐゴシック" charset="-128"/>
-                </a:defRPr>
-              </a:lvl3pPr>
-              <a:lvl4pPr eaLnBrk="0" hangingPunct="0">
-                <a:defRPr sz="2400">
-                  <a:solidFill>
-                    <a:schemeClr val="tx1"/>
-                  </a:solidFill>
-                  <a:latin typeface="Arial" charset="0"/>
-                  <a:ea typeface="ＭＳ Ｐゴシック" charset="-128"/>
-                </a:defRPr>
-              </a:lvl4pPr>
-              <a:lvl5pPr eaLnBrk="0" hangingPunct="0">
-                <a:defRPr sz="2400">
-                  <a:solidFill>
-                    <a:schemeClr val="tx1"/>
-                  </a:solidFill>
-                  <a:latin typeface="Arial" charset="0"/>
-                  <a:ea typeface="ＭＳ Ｐゴシック" charset="-128"/>
-                </a:defRPr>
-              </a:lvl5pPr>
-              <a:lvl6pPr marL="457200" eaLnBrk="0" fontAlgn="base" hangingPunct="0">
-                <a:spcBef>
-                  <a:spcPct val="0"/>
-                </a:spcBef>
-                <a:spcAft>
-                  <a:spcPct val="0"/>
-                </a:spcAft>
-                <a:defRPr sz="2400">
-                  <a:solidFill>
-                    <a:schemeClr val="tx1"/>
-                  </a:solidFill>
-                  <a:latin typeface="Arial" charset="0"/>
-                  <a:ea typeface="ＭＳ Ｐゴシック" charset="-128"/>
-                </a:defRPr>
-              </a:lvl6pPr>
-              <a:lvl7pPr marL="914400" eaLnBrk="0" fontAlgn="base" hangingPunct="0">
-                <a:spcBef>
-                  <a:spcPct val="0"/>
-                </a:spcBef>
-                <a:spcAft>
-                  <a:spcPct val="0"/>
-                </a:spcAft>
-                <a:defRPr sz="2400">
-                  <a:solidFill>
-                    <a:schemeClr val="tx1"/>
-                  </a:solidFill>
-                  <a:latin typeface="Arial" charset="0"/>
-                  <a:ea typeface="ＭＳ Ｐゴシック" charset="-128"/>
-                </a:defRPr>
-              </a:lvl7pPr>
-              <a:lvl8pPr marL="1371600" eaLnBrk="0" fontAlgn="base" hangingPunct="0">
-                <a:spcBef>
-                  <a:spcPct val="0"/>
-                </a:spcBef>
-                <a:spcAft>
-                  <a:spcPct val="0"/>
-                </a:spcAft>
-                <a:defRPr sz="2400">
-                  <a:solidFill>
-                    <a:schemeClr val="tx1"/>
-                  </a:solidFill>
-                  <a:latin typeface="Arial" charset="0"/>
-                  <a:ea typeface="ＭＳ Ｐゴシック" charset="-128"/>
-                </a:defRPr>
-              </a:lvl8pPr>
-              <a:lvl9pPr marL="1828800" eaLnBrk="0" fontAlgn="base" hangingPunct="0">
-                <a:spcBef>
-                  <a:spcPct val="0"/>
-                </a:spcBef>
-                <a:spcAft>
-                  <a:spcPct val="0"/>
-                </a:spcAft>
-                <a:defRPr sz="2400">
-                  <a:solidFill>
-                    <a:schemeClr val="tx1"/>
-                  </a:solidFill>
-                  <a:latin typeface="Arial" charset="0"/>
-                  <a:ea typeface="ＭＳ Ｐゴシック" charset="-128"/>
-                </a:defRPr>
-              </a:lvl9pPr>
-            </a:lstStyle>
-            <a:p>
-              <a:pPr algn="ctr" eaLnBrk="1" hangingPunct="1"/>
-              <a:endParaRPr lang="en-US" altLang="en-US" sz="1800">
+            <a:prstDash val="solid"/>
+            <a:round/>
+            <a:headEnd type="none" w="med" len="med"/>
+            <a:tailEnd type="none" w="med" len="med"/>
+          </a:ln>
+          <a:effectLst/>
+        </p:spPr>
+        <p:style>
+          <a:lnRef idx="1">
+            <a:schemeClr val="accent1"/>
+          </a:lnRef>
+          <a:fillRef idx="3">
+            <a:schemeClr val="accent1"/>
+          </a:fillRef>
+          <a:effectRef idx="2">
+            <a:schemeClr val="accent1"/>
+          </a:effectRef>
+          <a:fontRef idx="minor">
+            <a:schemeClr val="lt1"/>
+          </a:fontRef>
+        </p:style>
+        <p:txBody>
+          <a:bodyPr anchor="ctr"/>
+          <a:lstStyle>
+            <a:lvl1pPr eaLnBrk="0" hangingPunct="0">
+              <a:defRPr sz="2400">
+                <a:solidFill>
+                  <a:schemeClr val="tx1"/>
+                </a:solidFill>
+                <a:latin typeface="Arial" charset="0"/>
+                <a:ea typeface="ＭＳ Ｐゴシック" charset="-128"/>
+              </a:defRPr>
+            </a:lvl1pPr>
+            <a:lvl2pPr marL="37931725" indent="-37474525" eaLnBrk="0" hangingPunct="0">
+              <a:defRPr sz="2400">
+                <a:solidFill>
+                  <a:schemeClr val="tx1"/>
+                </a:solidFill>
+                <a:latin typeface="Arial" charset="0"/>
+                <a:ea typeface="ＭＳ Ｐゴシック" charset="-128"/>
+              </a:defRPr>
+            </a:lvl2pPr>
+            <a:lvl3pPr eaLnBrk="0" hangingPunct="0">
+              <a:defRPr sz="2400">
+                <a:solidFill>
+                  <a:schemeClr val="tx1"/>
+                </a:solidFill>
+                <a:latin typeface="Arial" charset="0"/>
+                <a:ea typeface="ＭＳ Ｐゴシック" charset="-128"/>
+              </a:defRPr>
+            </a:lvl3pPr>
+            <a:lvl4pPr eaLnBrk="0" hangingPunct="0">
+              <a:defRPr sz="2400">
+                <a:solidFill>
+                  <a:schemeClr val="tx1"/>
+                </a:solidFill>
+                <a:latin typeface="Arial" charset="0"/>
+                <a:ea typeface="ＭＳ Ｐゴシック" charset="-128"/>
+              </a:defRPr>
+            </a:lvl4pPr>
+            <a:lvl5pPr eaLnBrk="0" hangingPunct="0">
+              <a:defRPr sz="2400">
+                <a:solidFill>
+                  <a:schemeClr val="tx1"/>
+                </a:solidFill>
+                <a:latin typeface="Arial" charset="0"/>
+                <a:ea typeface="ＭＳ Ｐゴシック" charset="-128"/>
+              </a:defRPr>
+            </a:lvl5pPr>
+            <a:lvl6pPr marL="457200" eaLnBrk="0" fontAlgn="base" hangingPunct="0">
+              <a:spcBef>
+                <a:spcPct val="0"/>
+              </a:spcBef>
+              <a:spcAft>
+                <a:spcPct val="0"/>
+              </a:spcAft>
+              <a:defRPr sz="2400">
+                <a:solidFill>
+                  <a:schemeClr val="tx1"/>
+                </a:solidFill>
+                <a:latin typeface="Arial" charset="0"/>
+                <a:ea typeface="ＭＳ Ｐゴシック" charset="-128"/>
+              </a:defRPr>
+            </a:lvl6pPr>
+            <a:lvl7pPr marL="914400" eaLnBrk="0" fontAlgn="base" hangingPunct="0">
+              <a:spcBef>
+                <a:spcPct val="0"/>
+              </a:spcBef>
+              <a:spcAft>
+                <a:spcPct val="0"/>
+              </a:spcAft>
+              <a:defRPr sz="2400">
+                <a:solidFill>
+                  <a:schemeClr val="tx1"/>
+                </a:solidFill>
+                <a:latin typeface="Arial" charset="0"/>
+                <a:ea typeface="ＭＳ Ｐゴシック" charset="-128"/>
+              </a:defRPr>
+            </a:lvl7pPr>
+            <a:lvl8pPr marL="1371600" eaLnBrk="0" fontAlgn="base" hangingPunct="0">
+              <a:spcBef>
+                <a:spcPct val="0"/>
+              </a:spcBef>
+              <a:spcAft>
+                <a:spcPct val="0"/>
+              </a:spcAft>
+              <a:defRPr sz="2400">
+                <a:solidFill>
+                  <a:schemeClr val="tx1"/>
+                </a:solidFill>
+                <a:latin typeface="Arial" charset="0"/>
+                <a:ea typeface="ＭＳ Ｐゴシック" charset="-128"/>
+              </a:defRPr>
+            </a:lvl8pPr>
+            <a:lvl9pPr marL="1828800" eaLnBrk="0" fontAlgn="base" hangingPunct="0">
+              <a:spcBef>
+                <a:spcPct val="0"/>
+              </a:spcBef>
+              <a:spcAft>
+                <a:spcPct val="0"/>
+              </a:spcAft>
+              <a:defRPr sz="2400">
+                <a:solidFill>
+                  <a:schemeClr val="tx1"/>
+                </a:solidFill>
+                <a:latin typeface="Arial" charset="0"/>
+                <a:ea typeface="ＭＳ Ｐゴシック" charset="-128"/>
+              </a:defRPr>
+            </a:lvl9pPr>
+          </a:lstStyle>
+          <a:p>
+            <a:pPr algn="ctr" eaLnBrk="1" hangingPunct="1"/>
+            <a:r>
+              <a:rPr lang="en-US" altLang="en-US" sz="1800">
                 <a:solidFill>
                   <a:srgbClr val="FFFFFF"/>
                 </a:solidFill>
-              </a:endParaRPr>
-            </a:p>
-          </p:txBody>
-        </p:sp>
-        <p:sp>
-          <p:nvSpPr>
-            <p:cNvPr id="16" name="L-Shape 15"/>
-            <p:cNvSpPr/>
-            <p:nvPr/>
-          </p:nvSpPr>
-          <p:spPr bwMode="auto">
-            <a:xfrm rot="13500000">
-              <a:off x="1849438" y="4289425"/>
-              <a:ext cx="115888" cy="115887"/>
-            </a:xfrm>
-            <a:prstGeom prst="corner">
-              <a:avLst>
-                <a:gd name="adj1" fmla="val 15044"/>
-                <a:gd name="adj2" fmla="val 14015"/>
-              </a:avLst>
-            </a:prstGeom>
+                <a:cs typeface="Arial" charset="0"/>
+              </a:rPr>
+              <a:t>analyses</a:t>
+            </a:r>
+          </a:p>
+        </p:txBody>
+      </p:sp>
+      <p:sp>
+        <p:nvSpPr>
+          <p:cNvPr id="11" name="Rounded Rectangle 10"/>
+          <p:cNvSpPr/>
+          <p:nvPr/>
+        </p:nvSpPr>
+        <p:spPr bwMode="auto">
+          <a:xfrm>
+            <a:off x="2516187" y="911720"/>
+            <a:ext cx="1368425" cy="609600"/>
+          </a:xfrm>
+          <a:prstGeom prst="roundRect">
+            <a:avLst/>
+          </a:prstGeom>
+          <a:solidFill>
+            <a:schemeClr val="accent1"/>
+          </a:solidFill>
+          <a:ln w="19050" cap="flat" cmpd="sng" algn="ctr">
             <a:solidFill>
               <a:schemeClr val="bg1"/>
             </a:solidFill>
-            <a:ln>
+            <a:prstDash val="solid"/>
+            <a:round/>
+            <a:headEnd type="none" w="med" len="med"/>
+            <a:tailEnd type="none" w="med" len="med"/>
+          </a:ln>
+          <a:effectLst/>
+        </p:spPr>
+        <p:style>
+          <a:lnRef idx="1">
+            <a:schemeClr val="accent1"/>
+          </a:lnRef>
+          <a:fillRef idx="3">
+            <a:schemeClr val="accent1"/>
+          </a:fillRef>
+          <a:effectRef idx="2">
+            <a:schemeClr val="accent1"/>
+          </a:effectRef>
+          <a:fontRef idx="minor">
+            <a:schemeClr val="lt1"/>
+          </a:fontRef>
+        </p:style>
+        <p:txBody>
+          <a:bodyPr anchor="ctr"/>
+          <a:lstStyle>
+            <a:lvl1pPr eaLnBrk="0" hangingPunct="0">
+              <a:defRPr sz="2400">
+                <a:solidFill>
+                  <a:schemeClr val="tx1"/>
+                </a:solidFill>
+                <a:latin typeface="Arial" charset="0"/>
+                <a:ea typeface="ＭＳ Ｐゴシック" charset="-128"/>
+              </a:defRPr>
+            </a:lvl1pPr>
+            <a:lvl2pPr marL="37931725" indent="-37474525" eaLnBrk="0" hangingPunct="0">
+              <a:defRPr sz="2400">
+                <a:solidFill>
+                  <a:schemeClr val="tx1"/>
+                </a:solidFill>
+                <a:latin typeface="Arial" charset="0"/>
+                <a:ea typeface="ＭＳ Ｐゴシック" charset="-128"/>
+              </a:defRPr>
+            </a:lvl2pPr>
+            <a:lvl3pPr eaLnBrk="0" hangingPunct="0">
+              <a:defRPr sz="2400">
+                <a:solidFill>
+                  <a:schemeClr val="tx1"/>
+                </a:solidFill>
+                <a:latin typeface="Arial" charset="0"/>
+                <a:ea typeface="ＭＳ Ｐゴシック" charset="-128"/>
+              </a:defRPr>
+            </a:lvl3pPr>
+            <a:lvl4pPr eaLnBrk="0" hangingPunct="0">
+              <a:defRPr sz="2400">
+                <a:solidFill>
+                  <a:schemeClr val="tx1"/>
+                </a:solidFill>
+                <a:latin typeface="Arial" charset="0"/>
+                <a:ea typeface="ＭＳ Ｐゴシック" charset="-128"/>
+              </a:defRPr>
+            </a:lvl4pPr>
+            <a:lvl5pPr eaLnBrk="0" hangingPunct="0">
+              <a:defRPr sz="2400">
+                <a:solidFill>
+                  <a:schemeClr val="tx1"/>
+                </a:solidFill>
+                <a:latin typeface="Arial" charset="0"/>
+                <a:ea typeface="ＭＳ Ｐゴシック" charset="-128"/>
+              </a:defRPr>
+            </a:lvl5pPr>
+            <a:lvl6pPr marL="457200" eaLnBrk="0" fontAlgn="base" hangingPunct="0">
+              <a:spcBef>
+                <a:spcPct val="0"/>
+              </a:spcBef>
+              <a:spcAft>
+                <a:spcPct val="0"/>
+              </a:spcAft>
+              <a:defRPr sz="2400">
+                <a:solidFill>
+                  <a:schemeClr val="tx1"/>
+                </a:solidFill>
+                <a:latin typeface="Arial" charset="0"/>
+                <a:ea typeface="ＭＳ Ｐゴシック" charset="-128"/>
+              </a:defRPr>
+            </a:lvl6pPr>
+            <a:lvl7pPr marL="914400" eaLnBrk="0" fontAlgn="base" hangingPunct="0">
+              <a:spcBef>
+                <a:spcPct val="0"/>
+              </a:spcBef>
+              <a:spcAft>
+                <a:spcPct val="0"/>
+              </a:spcAft>
+              <a:defRPr sz="2400">
+                <a:solidFill>
+                  <a:schemeClr val="tx1"/>
+                </a:solidFill>
+                <a:latin typeface="Arial" charset="0"/>
+                <a:ea typeface="ＭＳ Ｐゴシック" charset="-128"/>
+              </a:defRPr>
+            </a:lvl7pPr>
+            <a:lvl8pPr marL="1371600" eaLnBrk="0" fontAlgn="base" hangingPunct="0">
+              <a:spcBef>
+                <a:spcPct val="0"/>
+              </a:spcBef>
+              <a:spcAft>
+                <a:spcPct val="0"/>
+              </a:spcAft>
+              <a:defRPr sz="2400">
+                <a:solidFill>
+                  <a:schemeClr val="tx1"/>
+                </a:solidFill>
+                <a:latin typeface="Arial" charset="0"/>
+                <a:ea typeface="ＭＳ Ｐゴシック" charset="-128"/>
+              </a:defRPr>
+            </a:lvl8pPr>
+            <a:lvl9pPr marL="1828800" eaLnBrk="0" fontAlgn="base" hangingPunct="0">
+              <a:spcBef>
+                <a:spcPct val="0"/>
+              </a:spcBef>
+              <a:spcAft>
+                <a:spcPct val="0"/>
+              </a:spcAft>
+              <a:defRPr sz="2400">
+                <a:solidFill>
+                  <a:schemeClr val="tx1"/>
+                </a:solidFill>
+                <a:latin typeface="Arial" charset="0"/>
+                <a:ea typeface="ＭＳ Ｐゴシック" charset="-128"/>
+              </a:defRPr>
+            </a:lvl9pPr>
+          </a:lstStyle>
+          <a:p>
+            <a:pPr algn="ctr" eaLnBrk="1" hangingPunct="1"/>
+            <a:r>
+              <a:rPr lang="en-US" altLang="en-US" sz="1800" smtClean="0">
+                <a:solidFill>
+                  <a:srgbClr val="FFFFFF"/>
+                </a:solidFill>
+                <a:cs typeface="Arial" charset="0"/>
+              </a:rPr>
+              <a:t>mobsim</a:t>
+            </a:r>
+            <a:endParaRPr lang="en-US" altLang="en-US" sz="1800" dirty="0">
               <a:solidFill>
-                <a:schemeClr val="bg1"/>
+                <a:srgbClr val="FFFFFF"/>
               </a:solidFill>
-            </a:ln>
-            <a:effectLst/>
-          </p:spPr>
-          <p:style>
-            <a:lnRef idx="1">
-              <a:schemeClr val="accent1"/>
-            </a:lnRef>
-            <a:fillRef idx="3">
-              <a:schemeClr val="accent1"/>
-            </a:fillRef>
-            <a:effectRef idx="2">
-              <a:schemeClr val="accent1"/>
-            </a:effectRef>
-            <a:fontRef idx="minor">
-              <a:schemeClr val="lt1"/>
-            </a:fontRef>
-          </p:style>
-          <p:txBody>
-            <a:bodyPr anchor="ctr"/>
-            <a:lstStyle>
-              <a:lvl1pPr eaLnBrk="0" hangingPunct="0">
-                <a:defRPr sz="2400">
-                  <a:solidFill>
-                    <a:schemeClr val="tx1"/>
-                  </a:solidFill>
-                  <a:latin typeface="Arial" charset="0"/>
-                  <a:ea typeface="ＭＳ Ｐゴシック" charset="-128"/>
-                </a:defRPr>
-              </a:lvl1pPr>
-              <a:lvl2pPr marL="37931725" indent="-37474525" eaLnBrk="0" hangingPunct="0">
-                <a:defRPr sz="2400">
-                  <a:solidFill>
-                    <a:schemeClr val="tx1"/>
-                  </a:solidFill>
-                  <a:latin typeface="Arial" charset="0"/>
-                  <a:ea typeface="ＭＳ Ｐゴシック" charset="-128"/>
-                </a:defRPr>
-              </a:lvl2pPr>
-              <a:lvl3pPr eaLnBrk="0" hangingPunct="0">
-                <a:defRPr sz="2400">
-                  <a:solidFill>
-                    <a:schemeClr val="tx1"/>
-                  </a:solidFill>
-                  <a:latin typeface="Arial" charset="0"/>
-                  <a:ea typeface="ＭＳ Ｐゴシック" charset="-128"/>
-                </a:defRPr>
-              </a:lvl3pPr>
-              <a:lvl4pPr eaLnBrk="0" hangingPunct="0">
-                <a:defRPr sz="2400">
-                  <a:solidFill>
-                    <a:schemeClr val="tx1"/>
-                  </a:solidFill>
-                  <a:latin typeface="Arial" charset="0"/>
-                  <a:ea typeface="ＭＳ Ｐゴシック" charset="-128"/>
-                </a:defRPr>
-              </a:lvl4pPr>
-              <a:lvl5pPr eaLnBrk="0" hangingPunct="0">
-                <a:defRPr sz="2400">
-                  <a:solidFill>
-                    <a:schemeClr val="tx1"/>
-                  </a:solidFill>
-                  <a:latin typeface="Arial" charset="0"/>
-                  <a:ea typeface="ＭＳ Ｐゴシック" charset="-128"/>
-                </a:defRPr>
-              </a:lvl5pPr>
-              <a:lvl6pPr marL="457200" eaLnBrk="0" fontAlgn="base" hangingPunct="0">
-                <a:spcBef>
-                  <a:spcPct val="0"/>
-                </a:spcBef>
-                <a:spcAft>
-                  <a:spcPct val="0"/>
-                </a:spcAft>
-                <a:defRPr sz="2400">
-                  <a:solidFill>
-                    <a:schemeClr val="tx1"/>
-                  </a:solidFill>
-                  <a:latin typeface="Arial" charset="0"/>
-                  <a:ea typeface="ＭＳ Ｐゴシック" charset="-128"/>
-                </a:defRPr>
-              </a:lvl6pPr>
-              <a:lvl7pPr marL="914400" eaLnBrk="0" fontAlgn="base" hangingPunct="0">
-                <a:spcBef>
-                  <a:spcPct val="0"/>
-                </a:spcBef>
-                <a:spcAft>
-                  <a:spcPct val="0"/>
-                </a:spcAft>
-                <a:defRPr sz="2400">
-                  <a:solidFill>
-                    <a:schemeClr val="tx1"/>
-                  </a:solidFill>
-                  <a:latin typeface="Arial" charset="0"/>
-                  <a:ea typeface="ＭＳ Ｐゴシック" charset="-128"/>
-                </a:defRPr>
-              </a:lvl7pPr>
-              <a:lvl8pPr marL="1371600" eaLnBrk="0" fontAlgn="base" hangingPunct="0">
-                <a:spcBef>
-                  <a:spcPct val="0"/>
-                </a:spcBef>
-                <a:spcAft>
-                  <a:spcPct val="0"/>
-                </a:spcAft>
-                <a:defRPr sz="2400">
-                  <a:solidFill>
-                    <a:schemeClr val="tx1"/>
-                  </a:solidFill>
-                  <a:latin typeface="Arial" charset="0"/>
-                  <a:ea typeface="ＭＳ Ｐゴシック" charset="-128"/>
-                </a:defRPr>
-              </a:lvl8pPr>
-              <a:lvl9pPr marL="1828800" eaLnBrk="0" fontAlgn="base" hangingPunct="0">
-                <a:spcBef>
-                  <a:spcPct val="0"/>
-                </a:spcBef>
-                <a:spcAft>
-                  <a:spcPct val="0"/>
-                </a:spcAft>
-                <a:defRPr sz="2400">
-                  <a:solidFill>
-                    <a:schemeClr val="tx1"/>
-                  </a:solidFill>
-                  <a:latin typeface="Arial" charset="0"/>
-                  <a:ea typeface="ＭＳ Ｐゴシック" charset="-128"/>
-                </a:defRPr>
-              </a:lvl9pPr>
-            </a:lstStyle>
-            <a:p>
-              <a:pPr algn="ctr" eaLnBrk="1" hangingPunct="1"/>
-              <a:endParaRPr lang="en-US" altLang="en-US" sz="1800">
-                <a:solidFill>
-                  <a:srgbClr val="FFFFFF"/>
-                </a:solidFill>
-              </a:endParaRPr>
-            </a:p>
-          </p:txBody>
-        </p:sp>
-        <p:sp>
-          <p:nvSpPr>
-            <p:cNvPr id="17" name="L-Shape 16"/>
-            <p:cNvSpPr/>
-            <p:nvPr/>
-          </p:nvSpPr>
-          <p:spPr bwMode="auto">
-            <a:xfrm rot="18900000">
-              <a:off x="6950075" y="4579938"/>
-              <a:ext cx="115888" cy="115887"/>
-            </a:xfrm>
-            <a:prstGeom prst="corner">
-              <a:avLst>
-                <a:gd name="adj1" fmla="val 15044"/>
-                <a:gd name="adj2" fmla="val 14015"/>
-              </a:avLst>
-            </a:prstGeom>
+              <a:cs typeface="Arial" charset="0"/>
+            </a:endParaRPr>
+          </a:p>
+        </p:txBody>
+      </p:sp>
+      <p:sp>
+        <p:nvSpPr>
+          <p:cNvPr id="12" name="Rounded Rectangle 11"/>
+          <p:cNvSpPr/>
+          <p:nvPr/>
+        </p:nvSpPr>
+        <p:spPr bwMode="auto">
+          <a:xfrm>
+            <a:off x="5253037" y="911720"/>
+            <a:ext cx="1366838" cy="609600"/>
+          </a:xfrm>
+          <a:prstGeom prst="roundRect">
+            <a:avLst/>
+          </a:prstGeom>
+          <a:solidFill>
+            <a:schemeClr val="accent1"/>
+          </a:solidFill>
+          <a:ln w="19050" cap="flat" cmpd="sng" algn="ctr">
             <a:solidFill>
               <a:schemeClr val="bg1"/>
             </a:solidFill>
-            <a:ln>
-              <a:solidFill>
-                <a:schemeClr val="bg1"/>
-              </a:solidFill>
-            </a:ln>
-            <a:effectLst/>
-          </p:spPr>
-          <p:style>
-            <a:lnRef idx="1">
-              <a:schemeClr val="accent1"/>
-            </a:lnRef>
-            <a:fillRef idx="3">
-              <a:schemeClr val="accent1"/>
-            </a:fillRef>
-            <a:effectRef idx="2">
-              <a:schemeClr val="accent1"/>
-            </a:effectRef>
-            <a:fontRef idx="minor">
-              <a:schemeClr val="lt1"/>
-            </a:fontRef>
-          </p:style>
-          <p:txBody>
-            <a:bodyPr anchor="ctr"/>
-            <a:lstStyle>
-              <a:lvl1pPr eaLnBrk="0" hangingPunct="0">
-                <a:defRPr sz="2400">
-                  <a:solidFill>
-                    <a:schemeClr val="tx1"/>
-                  </a:solidFill>
-                  <a:latin typeface="Arial" charset="0"/>
-                  <a:ea typeface="ＭＳ Ｐゴシック" charset="-128"/>
-                </a:defRPr>
-              </a:lvl1pPr>
-              <a:lvl2pPr marL="37931725" indent="-37474525" eaLnBrk="0" hangingPunct="0">
-                <a:defRPr sz="2400">
-                  <a:solidFill>
-                    <a:schemeClr val="tx1"/>
-                  </a:solidFill>
-                  <a:latin typeface="Arial" charset="0"/>
-                  <a:ea typeface="ＭＳ Ｐゴシック" charset="-128"/>
-                </a:defRPr>
-              </a:lvl2pPr>
-              <a:lvl3pPr eaLnBrk="0" hangingPunct="0">
-                <a:defRPr sz="2400">
-                  <a:solidFill>
-                    <a:schemeClr val="tx1"/>
-                  </a:solidFill>
-                  <a:latin typeface="Arial" charset="0"/>
-                  <a:ea typeface="ＭＳ Ｐゴシック" charset="-128"/>
-                </a:defRPr>
-              </a:lvl3pPr>
-              <a:lvl4pPr eaLnBrk="0" hangingPunct="0">
-                <a:defRPr sz="2400">
-                  <a:solidFill>
-                    <a:schemeClr val="tx1"/>
-                  </a:solidFill>
-                  <a:latin typeface="Arial" charset="0"/>
-                  <a:ea typeface="ＭＳ Ｐゴシック" charset="-128"/>
-                </a:defRPr>
-              </a:lvl4pPr>
-              <a:lvl5pPr eaLnBrk="0" hangingPunct="0">
-                <a:defRPr sz="2400">
-                  <a:solidFill>
-                    <a:schemeClr val="tx1"/>
-                  </a:solidFill>
-                  <a:latin typeface="Arial" charset="0"/>
-                  <a:ea typeface="ＭＳ Ｐゴシック" charset="-128"/>
-                </a:defRPr>
-              </a:lvl5pPr>
-              <a:lvl6pPr marL="457200" eaLnBrk="0" fontAlgn="base" hangingPunct="0">
-                <a:spcBef>
-                  <a:spcPct val="0"/>
-                </a:spcBef>
-                <a:spcAft>
-                  <a:spcPct val="0"/>
-                </a:spcAft>
-                <a:defRPr sz="2400">
-                  <a:solidFill>
-                    <a:schemeClr val="tx1"/>
-                  </a:solidFill>
-                  <a:latin typeface="Arial" charset="0"/>
-                  <a:ea typeface="ＭＳ Ｐゴシック" charset="-128"/>
-                </a:defRPr>
-              </a:lvl6pPr>
-              <a:lvl7pPr marL="914400" eaLnBrk="0" fontAlgn="base" hangingPunct="0">
-                <a:spcBef>
-                  <a:spcPct val="0"/>
-                </a:spcBef>
-                <a:spcAft>
-                  <a:spcPct val="0"/>
-                </a:spcAft>
-                <a:defRPr sz="2400">
-                  <a:solidFill>
-                    <a:schemeClr val="tx1"/>
-                  </a:solidFill>
-                  <a:latin typeface="Arial" charset="0"/>
-                  <a:ea typeface="ＭＳ Ｐゴシック" charset="-128"/>
-                </a:defRPr>
-              </a:lvl7pPr>
-              <a:lvl8pPr marL="1371600" eaLnBrk="0" fontAlgn="base" hangingPunct="0">
-                <a:spcBef>
-                  <a:spcPct val="0"/>
-                </a:spcBef>
-                <a:spcAft>
-                  <a:spcPct val="0"/>
-                </a:spcAft>
-                <a:defRPr sz="2400">
-                  <a:solidFill>
-                    <a:schemeClr val="tx1"/>
-                  </a:solidFill>
-                  <a:latin typeface="Arial" charset="0"/>
-                  <a:ea typeface="ＭＳ Ｐゴシック" charset="-128"/>
-                </a:defRPr>
-              </a:lvl8pPr>
-              <a:lvl9pPr marL="1828800" eaLnBrk="0" fontAlgn="base" hangingPunct="0">
-                <a:spcBef>
-                  <a:spcPct val="0"/>
-                </a:spcBef>
-                <a:spcAft>
-                  <a:spcPct val="0"/>
-                </a:spcAft>
-                <a:defRPr sz="2400">
-                  <a:solidFill>
-                    <a:schemeClr val="tx1"/>
-                  </a:solidFill>
-                  <a:latin typeface="Arial" charset="0"/>
-                  <a:ea typeface="ＭＳ Ｐゴシック" charset="-128"/>
-                </a:defRPr>
-              </a:lvl9pPr>
-            </a:lstStyle>
-            <a:p>
-              <a:pPr algn="ctr" eaLnBrk="1" hangingPunct="1"/>
-              <a:endParaRPr lang="en-US" altLang="en-US" sz="1800">
+            <a:prstDash val="solid"/>
+            <a:round/>
+            <a:headEnd type="none" w="med" len="med"/>
+            <a:tailEnd type="none" w="med" len="med"/>
+          </a:ln>
+          <a:effectLst/>
+        </p:spPr>
+        <p:style>
+          <a:lnRef idx="1">
+            <a:schemeClr val="accent1"/>
+          </a:lnRef>
+          <a:fillRef idx="3">
+            <a:schemeClr val="accent1"/>
+          </a:fillRef>
+          <a:effectRef idx="2">
+            <a:schemeClr val="accent1"/>
+          </a:effectRef>
+          <a:fontRef idx="minor">
+            <a:schemeClr val="lt1"/>
+          </a:fontRef>
+        </p:style>
+        <p:txBody>
+          <a:bodyPr anchor="ctr"/>
+          <a:lstStyle>
+            <a:lvl1pPr eaLnBrk="0" hangingPunct="0">
+              <a:defRPr sz="2400">
+                <a:solidFill>
+                  <a:schemeClr val="tx1"/>
+                </a:solidFill>
+                <a:latin typeface="Arial" charset="0"/>
+                <a:ea typeface="ＭＳ Ｐゴシック" charset="-128"/>
+              </a:defRPr>
+            </a:lvl1pPr>
+            <a:lvl2pPr marL="37931725" indent="-37474525" eaLnBrk="0" hangingPunct="0">
+              <a:defRPr sz="2400">
+                <a:solidFill>
+                  <a:schemeClr val="tx1"/>
+                </a:solidFill>
+                <a:latin typeface="Arial" charset="0"/>
+                <a:ea typeface="ＭＳ Ｐゴシック" charset="-128"/>
+              </a:defRPr>
+            </a:lvl2pPr>
+            <a:lvl3pPr eaLnBrk="0" hangingPunct="0">
+              <a:defRPr sz="2400">
+                <a:solidFill>
+                  <a:schemeClr val="tx1"/>
+                </a:solidFill>
+                <a:latin typeface="Arial" charset="0"/>
+                <a:ea typeface="ＭＳ Ｐゴシック" charset="-128"/>
+              </a:defRPr>
+            </a:lvl3pPr>
+            <a:lvl4pPr eaLnBrk="0" hangingPunct="0">
+              <a:defRPr sz="2400">
+                <a:solidFill>
+                  <a:schemeClr val="tx1"/>
+                </a:solidFill>
+                <a:latin typeface="Arial" charset="0"/>
+                <a:ea typeface="ＭＳ Ｐゴシック" charset="-128"/>
+              </a:defRPr>
+            </a:lvl4pPr>
+            <a:lvl5pPr eaLnBrk="0" hangingPunct="0">
+              <a:defRPr sz="2400">
+                <a:solidFill>
+                  <a:schemeClr val="tx1"/>
+                </a:solidFill>
+                <a:latin typeface="Arial" charset="0"/>
+                <a:ea typeface="ＭＳ Ｐゴシック" charset="-128"/>
+              </a:defRPr>
+            </a:lvl5pPr>
+            <a:lvl6pPr marL="457200" eaLnBrk="0" fontAlgn="base" hangingPunct="0">
+              <a:spcBef>
+                <a:spcPct val="0"/>
+              </a:spcBef>
+              <a:spcAft>
+                <a:spcPct val="0"/>
+              </a:spcAft>
+              <a:defRPr sz="2400">
+                <a:solidFill>
+                  <a:schemeClr val="tx1"/>
+                </a:solidFill>
+                <a:latin typeface="Arial" charset="0"/>
+                <a:ea typeface="ＭＳ Ｐゴシック" charset="-128"/>
+              </a:defRPr>
+            </a:lvl6pPr>
+            <a:lvl7pPr marL="914400" eaLnBrk="0" fontAlgn="base" hangingPunct="0">
+              <a:spcBef>
+                <a:spcPct val="0"/>
+              </a:spcBef>
+              <a:spcAft>
+                <a:spcPct val="0"/>
+              </a:spcAft>
+              <a:defRPr sz="2400">
+                <a:solidFill>
+                  <a:schemeClr val="tx1"/>
+                </a:solidFill>
+                <a:latin typeface="Arial" charset="0"/>
+                <a:ea typeface="ＭＳ Ｐゴシック" charset="-128"/>
+              </a:defRPr>
+            </a:lvl7pPr>
+            <a:lvl8pPr marL="1371600" eaLnBrk="0" fontAlgn="base" hangingPunct="0">
+              <a:spcBef>
+                <a:spcPct val="0"/>
+              </a:spcBef>
+              <a:spcAft>
+                <a:spcPct val="0"/>
+              </a:spcAft>
+              <a:defRPr sz="2400">
+                <a:solidFill>
+                  <a:schemeClr val="tx1"/>
+                </a:solidFill>
+                <a:latin typeface="Arial" charset="0"/>
+                <a:ea typeface="ＭＳ Ｐゴシック" charset="-128"/>
+              </a:defRPr>
+            </a:lvl8pPr>
+            <a:lvl9pPr marL="1828800" eaLnBrk="0" fontAlgn="base" hangingPunct="0">
+              <a:spcBef>
+                <a:spcPct val="0"/>
+              </a:spcBef>
+              <a:spcAft>
+                <a:spcPct val="0"/>
+              </a:spcAft>
+              <a:defRPr sz="2400">
+                <a:solidFill>
+                  <a:schemeClr val="tx1"/>
+                </a:solidFill>
+                <a:latin typeface="Arial" charset="0"/>
+                <a:ea typeface="ＭＳ Ｐゴシック" charset="-128"/>
+              </a:defRPr>
+            </a:lvl9pPr>
+          </a:lstStyle>
+          <a:p>
+            <a:pPr algn="ctr" eaLnBrk="1" hangingPunct="1"/>
+            <a:r>
+              <a:rPr lang="en-US" altLang="en-US" sz="1800">
                 <a:solidFill>
                   <a:srgbClr val="FFFFFF"/>
                 </a:solidFill>
-              </a:endParaRPr>
-            </a:p>
-          </p:txBody>
-        </p:sp>
-        <p:sp>
-          <p:nvSpPr>
-            <p:cNvPr id="18" name="L-Shape 17"/>
-            <p:cNvSpPr/>
-            <p:nvPr/>
-          </p:nvSpPr>
-          <p:spPr bwMode="auto">
-            <a:xfrm rot="2700000" flipV="1">
-              <a:off x="2081213" y="4579938"/>
-              <a:ext cx="115887" cy="115887"/>
-            </a:xfrm>
-            <a:prstGeom prst="corner">
-              <a:avLst>
-                <a:gd name="adj1" fmla="val 15044"/>
-                <a:gd name="adj2" fmla="val 14015"/>
-              </a:avLst>
-            </a:prstGeom>
+                <a:cs typeface="Arial" charset="0"/>
+              </a:rPr>
+              <a:t>scoring</a:t>
+            </a:r>
+          </a:p>
+        </p:txBody>
+      </p:sp>
+      <p:sp>
+        <p:nvSpPr>
+          <p:cNvPr id="13" name="Rounded Rectangle 12"/>
+          <p:cNvSpPr/>
+          <p:nvPr/>
+        </p:nvSpPr>
+        <p:spPr bwMode="auto">
+          <a:xfrm>
+            <a:off x="3884612" y="2054721"/>
+            <a:ext cx="1368425" cy="609600"/>
+          </a:xfrm>
+          <a:prstGeom prst="roundRect">
+            <a:avLst/>
+          </a:prstGeom>
+          <a:solidFill>
+            <a:schemeClr val="accent1"/>
+          </a:solidFill>
+          <a:ln w="19050" cap="flat" cmpd="sng" algn="ctr">
             <a:solidFill>
               <a:schemeClr val="bg1"/>
             </a:solidFill>
-            <a:ln>
+            <a:prstDash val="solid"/>
+            <a:round/>
+            <a:headEnd type="none" w="med" len="med"/>
+            <a:tailEnd type="none" w="med" len="med"/>
+          </a:ln>
+          <a:effectLst/>
+        </p:spPr>
+        <p:style>
+          <a:lnRef idx="1">
+            <a:schemeClr val="accent1"/>
+          </a:lnRef>
+          <a:fillRef idx="3">
+            <a:schemeClr val="accent1"/>
+          </a:fillRef>
+          <a:effectRef idx="2">
+            <a:schemeClr val="accent1"/>
+          </a:effectRef>
+          <a:fontRef idx="minor">
+            <a:schemeClr val="lt1"/>
+          </a:fontRef>
+        </p:style>
+        <p:txBody>
+          <a:bodyPr anchor="ctr"/>
+          <a:lstStyle>
+            <a:lvl1pPr eaLnBrk="0" hangingPunct="0">
+              <a:defRPr sz="2400">
+                <a:solidFill>
+                  <a:schemeClr val="tx1"/>
+                </a:solidFill>
+                <a:latin typeface="Arial" charset="0"/>
+                <a:ea typeface="ＭＳ Ｐゴシック" charset="-128"/>
+              </a:defRPr>
+            </a:lvl1pPr>
+            <a:lvl2pPr marL="37931725" indent="-37474525" eaLnBrk="0" hangingPunct="0">
+              <a:defRPr sz="2400">
+                <a:solidFill>
+                  <a:schemeClr val="tx1"/>
+                </a:solidFill>
+                <a:latin typeface="Arial" charset="0"/>
+                <a:ea typeface="ＭＳ Ｐゴシック" charset="-128"/>
+              </a:defRPr>
+            </a:lvl2pPr>
+            <a:lvl3pPr eaLnBrk="0" hangingPunct="0">
+              <a:defRPr sz="2400">
+                <a:solidFill>
+                  <a:schemeClr val="tx1"/>
+                </a:solidFill>
+                <a:latin typeface="Arial" charset="0"/>
+                <a:ea typeface="ＭＳ Ｐゴシック" charset="-128"/>
+              </a:defRPr>
+            </a:lvl3pPr>
+            <a:lvl4pPr eaLnBrk="0" hangingPunct="0">
+              <a:defRPr sz="2400">
+                <a:solidFill>
+                  <a:schemeClr val="tx1"/>
+                </a:solidFill>
+                <a:latin typeface="Arial" charset="0"/>
+                <a:ea typeface="ＭＳ Ｐゴシック" charset="-128"/>
+              </a:defRPr>
+            </a:lvl4pPr>
+            <a:lvl5pPr eaLnBrk="0" hangingPunct="0">
+              <a:defRPr sz="2400">
+                <a:solidFill>
+                  <a:schemeClr val="tx1"/>
+                </a:solidFill>
+                <a:latin typeface="Arial" charset="0"/>
+                <a:ea typeface="ＭＳ Ｐゴシック" charset="-128"/>
+              </a:defRPr>
+            </a:lvl5pPr>
+            <a:lvl6pPr marL="457200" eaLnBrk="0" fontAlgn="base" hangingPunct="0">
+              <a:spcBef>
+                <a:spcPct val="0"/>
+              </a:spcBef>
+              <a:spcAft>
+                <a:spcPct val="0"/>
+              </a:spcAft>
+              <a:defRPr sz="2400">
+                <a:solidFill>
+                  <a:schemeClr val="tx1"/>
+                </a:solidFill>
+                <a:latin typeface="Arial" charset="0"/>
+                <a:ea typeface="ＭＳ Ｐゴシック" charset="-128"/>
+              </a:defRPr>
+            </a:lvl6pPr>
+            <a:lvl7pPr marL="914400" eaLnBrk="0" fontAlgn="base" hangingPunct="0">
+              <a:spcBef>
+                <a:spcPct val="0"/>
+              </a:spcBef>
+              <a:spcAft>
+                <a:spcPct val="0"/>
+              </a:spcAft>
+              <a:defRPr sz="2400">
+                <a:solidFill>
+                  <a:schemeClr val="tx1"/>
+                </a:solidFill>
+                <a:latin typeface="Arial" charset="0"/>
+                <a:ea typeface="ＭＳ Ｐゴシック" charset="-128"/>
+              </a:defRPr>
+            </a:lvl7pPr>
+            <a:lvl8pPr marL="1371600" eaLnBrk="0" fontAlgn="base" hangingPunct="0">
+              <a:spcBef>
+                <a:spcPct val="0"/>
+              </a:spcBef>
+              <a:spcAft>
+                <a:spcPct val="0"/>
+              </a:spcAft>
+              <a:defRPr sz="2400">
+                <a:solidFill>
+                  <a:schemeClr val="tx1"/>
+                </a:solidFill>
+                <a:latin typeface="Arial" charset="0"/>
+                <a:ea typeface="ＭＳ Ｐゴシック" charset="-128"/>
+              </a:defRPr>
+            </a:lvl8pPr>
+            <a:lvl9pPr marL="1828800" eaLnBrk="0" fontAlgn="base" hangingPunct="0">
+              <a:spcBef>
+                <a:spcPct val="0"/>
+              </a:spcBef>
+              <a:spcAft>
+                <a:spcPct val="0"/>
+              </a:spcAft>
+              <a:defRPr sz="2400">
+                <a:solidFill>
+                  <a:schemeClr val="tx1"/>
+                </a:solidFill>
+                <a:latin typeface="Arial" charset="0"/>
+                <a:ea typeface="ＭＳ Ｐゴシック" charset="-128"/>
+              </a:defRPr>
+            </a:lvl9pPr>
+          </a:lstStyle>
+          <a:p>
+            <a:pPr algn="ctr" eaLnBrk="1" hangingPunct="1"/>
+            <a:r>
+              <a:rPr lang="en-US" altLang="en-US" sz="1800">
+                <a:solidFill>
+                  <a:srgbClr val="FFFFFF"/>
+                </a:solidFill>
+                <a:cs typeface="Arial" charset="0"/>
+              </a:rPr>
+              <a:t>replanning</a:t>
+            </a:r>
+          </a:p>
+        </p:txBody>
+      </p:sp>
+      <p:sp>
+        <p:nvSpPr>
+          <p:cNvPr id="14" name="L-Shape 13"/>
+          <p:cNvSpPr/>
+          <p:nvPr/>
+        </p:nvSpPr>
+        <p:spPr bwMode="auto">
+          <a:xfrm rot="13500000">
+            <a:off x="4441825" y="1162545"/>
+            <a:ext cx="115888" cy="115887"/>
+          </a:xfrm>
+          <a:prstGeom prst="corner">
+            <a:avLst>
+              <a:gd name="adj1" fmla="val 15044"/>
+              <a:gd name="adj2" fmla="val 14015"/>
+            </a:avLst>
+          </a:prstGeom>
+          <a:solidFill>
+            <a:schemeClr val="bg1"/>
+          </a:solidFill>
+          <a:ln>
+            <a:solidFill>
+              <a:schemeClr val="bg1"/>
+            </a:solidFill>
+          </a:ln>
+          <a:effectLst/>
+        </p:spPr>
+        <p:style>
+          <a:lnRef idx="1">
+            <a:schemeClr val="accent1"/>
+          </a:lnRef>
+          <a:fillRef idx="3">
+            <a:schemeClr val="accent1"/>
+          </a:fillRef>
+          <a:effectRef idx="2">
+            <a:schemeClr val="accent1"/>
+          </a:effectRef>
+          <a:fontRef idx="minor">
+            <a:schemeClr val="lt1"/>
+          </a:fontRef>
+        </p:style>
+        <p:txBody>
+          <a:bodyPr anchor="ctr"/>
+          <a:lstStyle>
+            <a:lvl1pPr eaLnBrk="0" hangingPunct="0">
+              <a:defRPr sz="2400">
+                <a:solidFill>
+                  <a:schemeClr val="tx1"/>
+                </a:solidFill>
+                <a:latin typeface="Arial" charset="0"/>
+                <a:ea typeface="ＭＳ Ｐゴシック" charset="-128"/>
+              </a:defRPr>
+            </a:lvl1pPr>
+            <a:lvl2pPr marL="37931725" indent="-37474525" eaLnBrk="0" hangingPunct="0">
+              <a:defRPr sz="2400">
+                <a:solidFill>
+                  <a:schemeClr val="tx1"/>
+                </a:solidFill>
+                <a:latin typeface="Arial" charset="0"/>
+                <a:ea typeface="ＭＳ Ｐゴシック" charset="-128"/>
+              </a:defRPr>
+            </a:lvl2pPr>
+            <a:lvl3pPr eaLnBrk="0" hangingPunct="0">
+              <a:defRPr sz="2400">
+                <a:solidFill>
+                  <a:schemeClr val="tx1"/>
+                </a:solidFill>
+                <a:latin typeface="Arial" charset="0"/>
+                <a:ea typeface="ＭＳ Ｐゴシック" charset="-128"/>
+              </a:defRPr>
+            </a:lvl3pPr>
+            <a:lvl4pPr eaLnBrk="0" hangingPunct="0">
+              <a:defRPr sz="2400">
+                <a:solidFill>
+                  <a:schemeClr val="tx1"/>
+                </a:solidFill>
+                <a:latin typeface="Arial" charset="0"/>
+                <a:ea typeface="ＭＳ Ｐゴシック" charset="-128"/>
+              </a:defRPr>
+            </a:lvl4pPr>
+            <a:lvl5pPr eaLnBrk="0" hangingPunct="0">
+              <a:defRPr sz="2400">
+                <a:solidFill>
+                  <a:schemeClr val="tx1"/>
+                </a:solidFill>
+                <a:latin typeface="Arial" charset="0"/>
+                <a:ea typeface="ＭＳ Ｐゴシック" charset="-128"/>
+              </a:defRPr>
+            </a:lvl5pPr>
+            <a:lvl6pPr marL="457200" eaLnBrk="0" fontAlgn="base" hangingPunct="0">
+              <a:spcBef>
+                <a:spcPct val="0"/>
+              </a:spcBef>
+              <a:spcAft>
+                <a:spcPct val="0"/>
+              </a:spcAft>
+              <a:defRPr sz="2400">
+                <a:solidFill>
+                  <a:schemeClr val="tx1"/>
+                </a:solidFill>
+                <a:latin typeface="Arial" charset="0"/>
+                <a:ea typeface="ＭＳ Ｐゴシック" charset="-128"/>
+              </a:defRPr>
+            </a:lvl6pPr>
+            <a:lvl7pPr marL="914400" eaLnBrk="0" fontAlgn="base" hangingPunct="0">
+              <a:spcBef>
+                <a:spcPct val="0"/>
+              </a:spcBef>
+              <a:spcAft>
+                <a:spcPct val="0"/>
+              </a:spcAft>
+              <a:defRPr sz="2400">
+                <a:solidFill>
+                  <a:schemeClr val="tx1"/>
+                </a:solidFill>
+                <a:latin typeface="Arial" charset="0"/>
+                <a:ea typeface="ＭＳ Ｐゴシック" charset="-128"/>
+              </a:defRPr>
+            </a:lvl7pPr>
+            <a:lvl8pPr marL="1371600" eaLnBrk="0" fontAlgn="base" hangingPunct="0">
+              <a:spcBef>
+                <a:spcPct val="0"/>
+              </a:spcBef>
+              <a:spcAft>
+                <a:spcPct val="0"/>
+              </a:spcAft>
+              <a:defRPr sz="2400">
+                <a:solidFill>
+                  <a:schemeClr val="tx1"/>
+                </a:solidFill>
+                <a:latin typeface="Arial" charset="0"/>
+                <a:ea typeface="ＭＳ Ｐゴシック" charset="-128"/>
+              </a:defRPr>
+            </a:lvl8pPr>
+            <a:lvl9pPr marL="1828800" eaLnBrk="0" fontAlgn="base" hangingPunct="0">
+              <a:spcBef>
+                <a:spcPct val="0"/>
+              </a:spcBef>
+              <a:spcAft>
+                <a:spcPct val="0"/>
+              </a:spcAft>
+              <a:defRPr sz="2400">
+                <a:solidFill>
+                  <a:schemeClr val="tx1"/>
+                </a:solidFill>
+                <a:latin typeface="Arial" charset="0"/>
+                <a:ea typeface="ＭＳ Ｐゴシック" charset="-128"/>
+              </a:defRPr>
+            </a:lvl9pPr>
+          </a:lstStyle>
+          <a:p>
+            <a:pPr algn="ctr" eaLnBrk="1" hangingPunct="1"/>
+            <a:endParaRPr lang="en-US" altLang="en-US" sz="1800">
               <a:solidFill>
-                <a:schemeClr val="bg1"/>
+                <a:srgbClr val="FFFFFF"/>
               </a:solidFill>
-            </a:ln>
-            <a:effectLst/>
-          </p:spPr>
-          <p:style>
-            <a:lnRef idx="1">
-              <a:schemeClr val="accent1"/>
-            </a:lnRef>
-            <a:fillRef idx="3">
-              <a:schemeClr val="accent1"/>
-            </a:fillRef>
-            <a:effectRef idx="2">
-              <a:schemeClr val="accent1"/>
-            </a:effectRef>
-            <a:fontRef idx="minor">
-              <a:schemeClr val="lt1"/>
-            </a:fontRef>
-          </p:style>
-          <p:txBody>
-            <a:bodyPr anchor="ctr"/>
-            <a:lstStyle>
-              <a:lvl1pPr eaLnBrk="0" hangingPunct="0">
-                <a:defRPr sz="2400">
-                  <a:solidFill>
-                    <a:schemeClr val="tx1"/>
-                  </a:solidFill>
-                  <a:latin typeface="Arial" charset="0"/>
-                  <a:ea typeface="ＭＳ Ｐゴシック" charset="-128"/>
-                </a:defRPr>
-              </a:lvl1pPr>
-              <a:lvl2pPr marL="37931725" indent="-37474525" eaLnBrk="0" hangingPunct="0">
-                <a:defRPr sz="2400">
-                  <a:solidFill>
-                    <a:schemeClr val="tx1"/>
-                  </a:solidFill>
-                  <a:latin typeface="Arial" charset="0"/>
-                  <a:ea typeface="ＭＳ Ｐゴシック" charset="-128"/>
-                </a:defRPr>
-              </a:lvl2pPr>
-              <a:lvl3pPr eaLnBrk="0" hangingPunct="0">
-                <a:defRPr sz="2400">
-                  <a:solidFill>
-                    <a:schemeClr val="tx1"/>
-                  </a:solidFill>
-                  <a:latin typeface="Arial" charset="0"/>
-                  <a:ea typeface="ＭＳ Ｐゴシック" charset="-128"/>
-                </a:defRPr>
-              </a:lvl3pPr>
-              <a:lvl4pPr eaLnBrk="0" hangingPunct="0">
-                <a:defRPr sz="2400">
-                  <a:solidFill>
-                    <a:schemeClr val="tx1"/>
-                  </a:solidFill>
-                  <a:latin typeface="Arial" charset="0"/>
-                  <a:ea typeface="ＭＳ Ｐゴシック" charset="-128"/>
-                </a:defRPr>
-              </a:lvl4pPr>
-              <a:lvl5pPr eaLnBrk="0" hangingPunct="0">
-                <a:defRPr sz="2400">
-                  <a:solidFill>
-                    <a:schemeClr val="tx1"/>
-                  </a:solidFill>
-                  <a:latin typeface="Arial" charset="0"/>
-                  <a:ea typeface="ＭＳ Ｐゴシック" charset="-128"/>
-                </a:defRPr>
-              </a:lvl5pPr>
-              <a:lvl6pPr marL="457200" eaLnBrk="0" fontAlgn="base" hangingPunct="0">
-                <a:spcBef>
-                  <a:spcPct val="0"/>
-                </a:spcBef>
-                <a:spcAft>
-                  <a:spcPct val="0"/>
-                </a:spcAft>
-                <a:defRPr sz="2400">
-                  <a:solidFill>
-                    <a:schemeClr val="tx1"/>
-                  </a:solidFill>
-                  <a:latin typeface="Arial" charset="0"/>
-                  <a:ea typeface="ＭＳ Ｐゴシック" charset="-128"/>
-                </a:defRPr>
-              </a:lvl6pPr>
-              <a:lvl7pPr marL="914400" eaLnBrk="0" fontAlgn="base" hangingPunct="0">
-                <a:spcBef>
-                  <a:spcPct val="0"/>
-                </a:spcBef>
-                <a:spcAft>
-                  <a:spcPct val="0"/>
-                </a:spcAft>
-                <a:defRPr sz="2400">
-                  <a:solidFill>
-                    <a:schemeClr val="tx1"/>
-                  </a:solidFill>
-                  <a:latin typeface="Arial" charset="0"/>
-                  <a:ea typeface="ＭＳ Ｐゴシック" charset="-128"/>
-                </a:defRPr>
-              </a:lvl7pPr>
-              <a:lvl8pPr marL="1371600" eaLnBrk="0" fontAlgn="base" hangingPunct="0">
-                <a:spcBef>
-                  <a:spcPct val="0"/>
-                </a:spcBef>
-                <a:spcAft>
-                  <a:spcPct val="0"/>
-                </a:spcAft>
-                <a:defRPr sz="2400">
-                  <a:solidFill>
-                    <a:schemeClr val="tx1"/>
-                  </a:solidFill>
-                  <a:latin typeface="Arial" charset="0"/>
-                  <a:ea typeface="ＭＳ Ｐゴシック" charset="-128"/>
-                </a:defRPr>
-              </a:lvl8pPr>
-              <a:lvl9pPr marL="1828800" eaLnBrk="0" fontAlgn="base" hangingPunct="0">
-                <a:spcBef>
-                  <a:spcPct val="0"/>
-                </a:spcBef>
-                <a:spcAft>
-                  <a:spcPct val="0"/>
-                </a:spcAft>
-                <a:defRPr sz="2400">
-                  <a:solidFill>
-                    <a:schemeClr val="tx1"/>
-                  </a:solidFill>
-                  <a:latin typeface="Arial" charset="0"/>
-                  <a:ea typeface="ＭＳ Ｐゴシック" charset="-128"/>
-                </a:defRPr>
-              </a:lvl9pPr>
-            </a:lstStyle>
-            <a:p>
-              <a:pPr algn="ctr" eaLnBrk="1" hangingPunct="1"/>
-              <a:endParaRPr lang="en-US" altLang="en-US" sz="1800">
-                <a:solidFill>
-                  <a:srgbClr val="FFFFFF"/>
-                </a:solidFill>
-              </a:endParaRPr>
-            </a:p>
-          </p:txBody>
-        </p:sp>
-      </p:grpSp>
+            </a:endParaRPr>
+          </a:p>
+        </p:txBody>
+      </p:sp>
+      <p:sp>
+        <p:nvSpPr>
+          <p:cNvPr id="15" name="L-Shape 14"/>
+          <p:cNvSpPr/>
+          <p:nvPr/>
+        </p:nvSpPr>
+        <p:spPr bwMode="auto">
+          <a:xfrm rot="13500000">
+            <a:off x="7032625" y="1162545"/>
+            <a:ext cx="115888" cy="115887"/>
+          </a:xfrm>
+          <a:prstGeom prst="corner">
+            <a:avLst>
+              <a:gd name="adj1" fmla="val 15044"/>
+              <a:gd name="adj2" fmla="val 14015"/>
+            </a:avLst>
+          </a:prstGeom>
+          <a:solidFill>
+            <a:schemeClr val="bg1"/>
+          </a:solidFill>
+          <a:ln>
+            <a:solidFill>
+              <a:schemeClr val="bg1"/>
+            </a:solidFill>
+          </a:ln>
+          <a:effectLst/>
+        </p:spPr>
+        <p:style>
+          <a:lnRef idx="1">
+            <a:schemeClr val="accent1"/>
+          </a:lnRef>
+          <a:fillRef idx="3">
+            <a:schemeClr val="accent1"/>
+          </a:fillRef>
+          <a:effectRef idx="2">
+            <a:schemeClr val="accent1"/>
+          </a:effectRef>
+          <a:fontRef idx="minor">
+            <a:schemeClr val="lt1"/>
+          </a:fontRef>
+        </p:style>
+        <p:txBody>
+          <a:bodyPr anchor="ctr"/>
+          <a:lstStyle>
+            <a:lvl1pPr eaLnBrk="0" hangingPunct="0">
+              <a:defRPr sz="2400">
+                <a:solidFill>
+                  <a:schemeClr val="tx1"/>
+                </a:solidFill>
+                <a:latin typeface="Arial" charset="0"/>
+                <a:ea typeface="ＭＳ Ｐゴシック" charset="-128"/>
+              </a:defRPr>
+            </a:lvl1pPr>
+            <a:lvl2pPr marL="37931725" indent="-37474525" eaLnBrk="0" hangingPunct="0">
+              <a:defRPr sz="2400">
+                <a:solidFill>
+                  <a:schemeClr val="tx1"/>
+                </a:solidFill>
+                <a:latin typeface="Arial" charset="0"/>
+                <a:ea typeface="ＭＳ Ｐゴシック" charset="-128"/>
+              </a:defRPr>
+            </a:lvl2pPr>
+            <a:lvl3pPr eaLnBrk="0" hangingPunct="0">
+              <a:defRPr sz="2400">
+                <a:solidFill>
+                  <a:schemeClr val="tx1"/>
+                </a:solidFill>
+                <a:latin typeface="Arial" charset="0"/>
+                <a:ea typeface="ＭＳ Ｐゴシック" charset="-128"/>
+              </a:defRPr>
+            </a:lvl3pPr>
+            <a:lvl4pPr eaLnBrk="0" hangingPunct="0">
+              <a:defRPr sz="2400">
+                <a:solidFill>
+                  <a:schemeClr val="tx1"/>
+                </a:solidFill>
+                <a:latin typeface="Arial" charset="0"/>
+                <a:ea typeface="ＭＳ Ｐゴシック" charset="-128"/>
+              </a:defRPr>
+            </a:lvl4pPr>
+            <a:lvl5pPr eaLnBrk="0" hangingPunct="0">
+              <a:defRPr sz="2400">
+                <a:solidFill>
+                  <a:schemeClr val="tx1"/>
+                </a:solidFill>
+                <a:latin typeface="Arial" charset="0"/>
+                <a:ea typeface="ＭＳ Ｐゴシック" charset="-128"/>
+              </a:defRPr>
+            </a:lvl5pPr>
+            <a:lvl6pPr marL="457200" eaLnBrk="0" fontAlgn="base" hangingPunct="0">
+              <a:spcBef>
+                <a:spcPct val="0"/>
+              </a:spcBef>
+              <a:spcAft>
+                <a:spcPct val="0"/>
+              </a:spcAft>
+              <a:defRPr sz="2400">
+                <a:solidFill>
+                  <a:schemeClr val="tx1"/>
+                </a:solidFill>
+                <a:latin typeface="Arial" charset="0"/>
+                <a:ea typeface="ＭＳ Ｐゴシック" charset="-128"/>
+              </a:defRPr>
+            </a:lvl6pPr>
+            <a:lvl7pPr marL="914400" eaLnBrk="0" fontAlgn="base" hangingPunct="0">
+              <a:spcBef>
+                <a:spcPct val="0"/>
+              </a:spcBef>
+              <a:spcAft>
+                <a:spcPct val="0"/>
+              </a:spcAft>
+              <a:defRPr sz="2400">
+                <a:solidFill>
+                  <a:schemeClr val="tx1"/>
+                </a:solidFill>
+                <a:latin typeface="Arial" charset="0"/>
+                <a:ea typeface="ＭＳ Ｐゴシック" charset="-128"/>
+              </a:defRPr>
+            </a:lvl7pPr>
+            <a:lvl8pPr marL="1371600" eaLnBrk="0" fontAlgn="base" hangingPunct="0">
+              <a:spcBef>
+                <a:spcPct val="0"/>
+              </a:spcBef>
+              <a:spcAft>
+                <a:spcPct val="0"/>
+              </a:spcAft>
+              <a:defRPr sz="2400">
+                <a:solidFill>
+                  <a:schemeClr val="tx1"/>
+                </a:solidFill>
+                <a:latin typeface="Arial" charset="0"/>
+                <a:ea typeface="ＭＳ Ｐゴシック" charset="-128"/>
+              </a:defRPr>
+            </a:lvl8pPr>
+            <a:lvl9pPr marL="1828800" eaLnBrk="0" fontAlgn="base" hangingPunct="0">
+              <a:spcBef>
+                <a:spcPct val="0"/>
+              </a:spcBef>
+              <a:spcAft>
+                <a:spcPct val="0"/>
+              </a:spcAft>
+              <a:defRPr sz="2400">
+                <a:solidFill>
+                  <a:schemeClr val="tx1"/>
+                </a:solidFill>
+                <a:latin typeface="Arial" charset="0"/>
+                <a:ea typeface="ＭＳ Ｐゴシック" charset="-128"/>
+              </a:defRPr>
+            </a:lvl9pPr>
+          </a:lstStyle>
+          <a:p>
+            <a:pPr algn="ctr" eaLnBrk="1" hangingPunct="1"/>
+            <a:endParaRPr lang="en-US" altLang="en-US" sz="1800">
+              <a:solidFill>
+                <a:srgbClr val="FFFFFF"/>
+              </a:solidFill>
+            </a:endParaRPr>
+          </a:p>
+        </p:txBody>
+      </p:sp>
+      <p:sp>
+        <p:nvSpPr>
+          <p:cNvPr id="16" name="L-Shape 15"/>
+          <p:cNvSpPr/>
+          <p:nvPr/>
+        </p:nvSpPr>
+        <p:spPr bwMode="auto">
+          <a:xfrm rot="13500000">
+            <a:off x="1847850" y="1162545"/>
+            <a:ext cx="115888" cy="115887"/>
+          </a:xfrm>
+          <a:prstGeom prst="corner">
+            <a:avLst>
+              <a:gd name="adj1" fmla="val 15044"/>
+              <a:gd name="adj2" fmla="val 14015"/>
+            </a:avLst>
+          </a:prstGeom>
+          <a:solidFill>
+            <a:schemeClr val="bg1"/>
+          </a:solidFill>
+          <a:ln>
+            <a:solidFill>
+              <a:schemeClr val="bg1"/>
+            </a:solidFill>
+          </a:ln>
+          <a:effectLst/>
+        </p:spPr>
+        <p:style>
+          <a:lnRef idx="1">
+            <a:schemeClr val="accent1"/>
+          </a:lnRef>
+          <a:fillRef idx="3">
+            <a:schemeClr val="accent1"/>
+          </a:fillRef>
+          <a:effectRef idx="2">
+            <a:schemeClr val="accent1"/>
+          </a:effectRef>
+          <a:fontRef idx="minor">
+            <a:schemeClr val="lt1"/>
+          </a:fontRef>
+        </p:style>
+        <p:txBody>
+          <a:bodyPr anchor="ctr"/>
+          <a:lstStyle>
+            <a:lvl1pPr eaLnBrk="0" hangingPunct="0">
+              <a:defRPr sz="2400">
+                <a:solidFill>
+                  <a:schemeClr val="tx1"/>
+                </a:solidFill>
+                <a:latin typeface="Arial" charset="0"/>
+                <a:ea typeface="ＭＳ Ｐゴシック" charset="-128"/>
+              </a:defRPr>
+            </a:lvl1pPr>
+            <a:lvl2pPr marL="37931725" indent="-37474525" eaLnBrk="0" hangingPunct="0">
+              <a:defRPr sz="2400">
+                <a:solidFill>
+                  <a:schemeClr val="tx1"/>
+                </a:solidFill>
+                <a:latin typeface="Arial" charset="0"/>
+                <a:ea typeface="ＭＳ Ｐゴシック" charset="-128"/>
+              </a:defRPr>
+            </a:lvl2pPr>
+            <a:lvl3pPr eaLnBrk="0" hangingPunct="0">
+              <a:defRPr sz="2400">
+                <a:solidFill>
+                  <a:schemeClr val="tx1"/>
+                </a:solidFill>
+                <a:latin typeface="Arial" charset="0"/>
+                <a:ea typeface="ＭＳ Ｐゴシック" charset="-128"/>
+              </a:defRPr>
+            </a:lvl3pPr>
+            <a:lvl4pPr eaLnBrk="0" hangingPunct="0">
+              <a:defRPr sz="2400">
+                <a:solidFill>
+                  <a:schemeClr val="tx1"/>
+                </a:solidFill>
+                <a:latin typeface="Arial" charset="0"/>
+                <a:ea typeface="ＭＳ Ｐゴシック" charset="-128"/>
+              </a:defRPr>
+            </a:lvl4pPr>
+            <a:lvl5pPr eaLnBrk="0" hangingPunct="0">
+              <a:defRPr sz="2400">
+                <a:solidFill>
+                  <a:schemeClr val="tx1"/>
+                </a:solidFill>
+                <a:latin typeface="Arial" charset="0"/>
+                <a:ea typeface="ＭＳ Ｐゴシック" charset="-128"/>
+              </a:defRPr>
+            </a:lvl5pPr>
+            <a:lvl6pPr marL="457200" eaLnBrk="0" fontAlgn="base" hangingPunct="0">
+              <a:spcBef>
+                <a:spcPct val="0"/>
+              </a:spcBef>
+              <a:spcAft>
+                <a:spcPct val="0"/>
+              </a:spcAft>
+              <a:defRPr sz="2400">
+                <a:solidFill>
+                  <a:schemeClr val="tx1"/>
+                </a:solidFill>
+                <a:latin typeface="Arial" charset="0"/>
+                <a:ea typeface="ＭＳ Ｐゴシック" charset="-128"/>
+              </a:defRPr>
+            </a:lvl6pPr>
+            <a:lvl7pPr marL="914400" eaLnBrk="0" fontAlgn="base" hangingPunct="0">
+              <a:spcBef>
+                <a:spcPct val="0"/>
+              </a:spcBef>
+              <a:spcAft>
+                <a:spcPct val="0"/>
+              </a:spcAft>
+              <a:defRPr sz="2400">
+                <a:solidFill>
+                  <a:schemeClr val="tx1"/>
+                </a:solidFill>
+                <a:latin typeface="Arial" charset="0"/>
+                <a:ea typeface="ＭＳ Ｐゴシック" charset="-128"/>
+              </a:defRPr>
+            </a:lvl7pPr>
+            <a:lvl8pPr marL="1371600" eaLnBrk="0" fontAlgn="base" hangingPunct="0">
+              <a:spcBef>
+                <a:spcPct val="0"/>
+              </a:spcBef>
+              <a:spcAft>
+                <a:spcPct val="0"/>
+              </a:spcAft>
+              <a:defRPr sz="2400">
+                <a:solidFill>
+                  <a:schemeClr val="tx1"/>
+                </a:solidFill>
+                <a:latin typeface="Arial" charset="0"/>
+                <a:ea typeface="ＭＳ Ｐゴシック" charset="-128"/>
+              </a:defRPr>
+            </a:lvl8pPr>
+            <a:lvl9pPr marL="1828800" eaLnBrk="0" fontAlgn="base" hangingPunct="0">
+              <a:spcBef>
+                <a:spcPct val="0"/>
+              </a:spcBef>
+              <a:spcAft>
+                <a:spcPct val="0"/>
+              </a:spcAft>
+              <a:defRPr sz="2400">
+                <a:solidFill>
+                  <a:schemeClr val="tx1"/>
+                </a:solidFill>
+                <a:latin typeface="Arial" charset="0"/>
+                <a:ea typeface="ＭＳ Ｐゴシック" charset="-128"/>
+              </a:defRPr>
+            </a:lvl9pPr>
+          </a:lstStyle>
+          <a:p>
+            <a:pPr algn="ctr" eaLnBrk="1" hangingPunct="1"/>
+            <a:endParaRPr lang="en-US" altLang="en-US" sz="1800">
+              <a:solidFill>
+                <a:srgbClr val="FFFFFF"/>
+              </a:solidFill>
+            </a:endParaRPr>
+          </a:p>
+        </p:txBody>
+      </p:sp>
+      <p:sp>
+        <p:nvSpPr>
+          <p:cNvPr id="17" name="L-Shape 16"/>
+          <p:cNvSpPr/>
+          <p:nvPr/>
+        </p:nvSpPr>
+        <p:spPr bwMode="auto">
+          <a:xfrm rot="18900000">
+            <a:off x="6948487" y="1453058"/>
+            <a:ext cx="115888" cy="115887"/>
+          </a:xfrm>
+          <a:prstGeom prst="corner">
+            <a:avLst>
+              <a:gd name="adj1" fmla="val 15044"/>
+              <a:gd name="adj2" fmla="val 14015"/>
+            </a:avLst>
+          </a:prstGeom>
+          <a:solidFill>
+            <a:schemeClr val="bg1"/>
+          </a:solidFill>
+          <a:ln>
+            <a:solidFill>
+              <a:schemeClr val="bg1"/>
+            </a:solidFill>
+          </a:ln>
+          <a:effectLst/>
+        </p:spPr>
+        <p:style>
+          <a:lnRef idx="1">
+            <a:schemeClr val="accent1"/>
+          </a:lnRef>
+          <a:fillRef idx="3">
+            <a:schemeClr val="accent1"/>
+          </a:fillRef>
+          <a:effectRef idx="2">
+            <a:schemeClr val="accent1"/>
+          </a:effectRef>
+          <a:fontRef idx="minor">
+            <a:schemeClr val="lt1"/>
+          </a:fontRef>
+        </p:style>
+        <p:txBody>
+          <a:bodyPr anchor="ctr"/>
+          <a:lstStyle>
+            <a:lvl1pPr eaLnBrk="0" hangingPunct="0">
+              <a:defRPr sz="2400">
+                <a:solidFill>
+                  <a:schemeClr val="tx1"/>
+                </a:solidFill>
+                <a:latin typeface="Arial" charset="0"/>
+                <a:ea typeface="ＭＳ Ｐゴシック" charset="-128"/>
+              </a:defRPr>
+            </a:lvl1pPr>
+            <a:lvl2pPr marL="37931725" indent="-37474525" eaLnBrk="0" hangingPunct="0">
+              <a:defRPr sz="2400">
+                <a:solidFill>
+                  <a:schemeClr val="tx1"/>
+                </a:solidFill>
+                <a:latin typeface="Arial" charset="0"/>
+                <a:ea typeface="ＭＳ Ｐゴシック" charset="-128"/>
+              </a:defRPr>
+            </a:lvl2pPr>
+            <a:lvl3pPr eaLnBrk="0" hangingPunct="0">
+              <a:defRPr sz="2400">
+                <a:solidFill>
+                  <a:schemeClr val="tx1"/>
+                </a:solidFill>
+                <a:latin typeface="Arial" charset="0"/>
+                <a:ea typeface="ＭＳ Ｐゴシック" charset="-128"/>
+              </a:defRPr>
+            </a:lvl3pPr>
+            <a:lvl4pPr eaLnBrk="0" hangingPunct="0">
+              <a:defRPr sz="2400">
+                <a:solidFill>
+                  <a:schemeClr val="tx1"/>
+                </a:solidFill>
+                <a:latin typeface="Arial" charset="0"/>
+                <a:ea typeface="ＭＳ Ｐゴシック" charset="-128"/>
+              </a:defRPr>
+            </a:lvl4pPr>
+            <a:lvl5pPr eaLnBrk="0" hangingPunct="0">
+              <a:defRPr sz="2400">
+                <a:solidFill>
+                  <a:schemeClr val="tx1"/>
+                </a:solidFill>
+                <a:latin typeface="Arial" charset="0"/>
+                <a:ea typeface="ＭＳ Ｐゴシック" charset="-128"/>
+              </a:defRPr>
+            </a:lvl5pPr>
+            <a:lvl6pPr marL="457200" eaLnBrk="0" fontAlgn="base" hangingPunct="0">
+              <a:spcBef>
+                <a:spcPct val="0"/>
+              </a:spcBef>
+              <a:spcAft>
+                <a:spcPct val="0"/>
+              </a:spcAft>
+              <a:defRPr sz="2400">
+                <a:solidFill>
+                  <a:schemeClr val="tx1"/>
+                </a:solidFill>
+                <a:latin typeface="Arial" charset="0"/>
+                <a:ea typeface="ＭＳ Ｐゴシック" charset="-128"/>
+              </a:defRPr>
+            </a:lvl6pPr>
+            <a:lvl7pPr marL="914400" eaLnBrk="0" fontAlgn="base" hangingPunct="0">
+              <a:spcBef>
+                <a:spcPct val="0"/>
+              </a:spcBef>
+              <a:spcAft>
+                <a:spcPct val="0"/>
+              </a:spcAft>
+              <a:defRPr sz="2400">
+                <a:solidFill>
+                  <a:schemeClr val="tx1"/>
+                </a:solidFill>
+                <a:latin typeface="Arial" charset="0"/>
+                <a:ea typeface="ＭＳ Ｐゴシック" charset="-128"/>
+              </a:defRPr>
+            </a:lvl7pPr>
+            <a:lvl8pPr marL="1371600" eaLnBrk="0" fontAlgn="base" hangingPunct="0">
+              <a:spcBef>
+                <a:spcPct val="0"/>
+              </a:spcBef>
+              <a:spcAft>
+                <a:spcPct val="0"/>
+              </a:spcAft>
+              <a:defRPr sz="2400">
+                <a:solidFill>
+                  <a:schemeClr val="tx1"/>
+                </a:solidFill>
+                <a:latin typeface="Arial" charset="0"/>
+                <a:ea typeface="ＭＳ Ｐゴシック" charset="-128"/>
+              </a:defRPr>
+            </a:lvl8pPr>
+            <a:lvl9pPr marL="1828800" eaLnBrk="0" fontAlgn="base" hangingPunct="0">
+              <a:spcBef>
+                <a:spcPct val="0"/>
+              </a:spcBef>
+              <a:spcAft>
+                <a:spcPct val="0"/>
+              </a:spcAft>
+              <a:defRPr sz="2400">
+                <a:solidFill>
+                  <a:schemeClr val="tx1"/>
+                </a:solidFill>
+                <a:latin typeface="Arial" charset="0"/>
+                <a:ea typeface="ＭＳ Ｐゴシック" charset="-128"/>
+              </a:defRPr>
+            </a:lvl9pPr>
+          </a:lstStyle>
+          <a:p>
+            <a:pPr algn="ctr" eaLnBrk="1" hangingPunct="1"/>
+            <a:endParaRPr lang="en-US" altLang="en-US" sz="1800">
+              <a:solidFill>
+                <a:srgbClr val="FFFFFF"/>
+              </a:solidFill>
+            </a:endParaRPr>
+          </a:p>
+        </p:txBody>
+      </p:sp>
+      <p:sp>
+        <p:nvSpPr>
+          <p:cNvPr id="18" name="L-Shape 17"/>
+          <p:cNvSpPr/>
+          <p:nvPr/>
+        </p:nvSpPr>
+        <p:spPr bwMode="auto">
+          <a:xfrm rot="2700000" flipV="1">
+            <a:off x="2079625" y="1453058"/>
+            <a:ext cx="115887" cy="115887"/>
+          </a:xfrm>
+          <a:prstGeom prst="corner">
+            <a:avLst>
+              <a:gd name="adj1" fmla="val 15044"/>
+              <a:gd name="adj2" fmla="val 14015"/>
+            </a:avLst>
+          </a:prstGeom>
+          <a:solidFill>
+            <a:schemeClr val="bg1"/>
+          </a:solidFill>
+          <a:ln>
+            <a:solidFill>
+              <a:schemeClr val="bg1"/>
+            </a:solidFill>
+          </a:ln>
+          <a:effectLst/>
+        </p:spPr>
+        <p:style>
+          <a:lnRef idx="1">
+            <a:schemeClr val="accent1"/>
+          </a:lnRef>
+          <a:fillRef idx="3">
+            <a:schemeClr val="accent1"/>
+          </a:fillRef>
+          <a:effectRef idx="2">
+            <a:schemeClr val="accent1"/>
+          </a:effectRef>
+          <a:fontRef idx="minor">
+            <a:schemeClr val="lt1"/>
+          </a:fontRef>
+        </p:style>
+        <p:txBody>
+          <a:bodyPr anchor="ctr"/>
+          <a:lstStyle>
+            <a:lvl1pPr eaLnBrk="0" hangingPunct="0">
+              <a:defRPr sz="2400">
+                <a:solidFill>
+                  <a:schemeClr val="tx1"/>
+                </a:solidFill>
+                <a:latin typeface="Arial" charset="0"/>
+                <a:ea typeface="ＭＳ Ｐゴシック" charset="-128"/>
+              </a:defRPr>
+            </a:lvl1pPr>
+            <a:lvl2pPr marL="37931725" indent="-37474525" eaLnBrk="0" hangingPunct="0">
+              <a:defRPr sz="2400">
+                <a:solidFill>
+                  <a:schemeClr val="tx1"/>
+                </a:solidFill>
+                <a:latin typeface="Arial" charset="0"/>
+                <a:ea typeface="ＭＳ Ｐゴシック" charset="-128"/>
+              </a:defRPr>
+            </a:lvl2pPr>
+            <a:lvl3pPr eaLnBrk="0" hangingPunct="0">
+              <a:defRPr sz="2400">
+                <a:solidFill>
+                  <a:schemeClr val="tx1"/>
+                </a:solidFill>
+                <a:latin typeface="Arial" charset="0"/>
+                <a:ea typeface="ＭＳ Ｐゴシック" charset="-128"/>
+              </a:defRPr>
+            </a:lvl3pPr>
+            <a:lvl4pPr eaLnBrk="0" hangingPunct="0">
+              <a:defRPr sz="2400">
+                <a:solidFill>
+                  <a:schemeClr val="tx1"/>
+                </a:solidFill>
+                <a:latin typeface="Arial" charset="0"/>
+                <a:ea typeface="ＭＳ Ｐゴシック" charset="-128"/>
+              </a:defRPr>
+            </a:lvl4pPr>
+            <a:lvl5pPr eaLnBrk="0" hangingPunct="0">
+              <a:defRPr sz="2400">
+                <a:solidFill>
+                  <a:schemeClr val="tx1"/>
+                </a:solidFill>
+                <a:latin typeface="Arial" charset="0"/>
+                <a:ea typeface="ＭＳ Ｐゴシック" charset="-128"/>
+              </a:defRPr>
+            </a:lvl5pPr>
+            <a:lvl6pPr marL="457200" eaLnBrk="0" fontAlgn="base" hangingPunct="0">
+              <a:spcBef>
+                <a:spcPct val="0"/>
+              </a:spcBef>
+              <a:spcAft>
+                <a:spcPct val="0"/>
+              </a:spcAft>
+              <a:defRPr sz="2400">
+                <a:solidFill>
+                  <a:schemeClr val="tx1"/>
+                </a:solidFill>
+                <a:latin typeface="Arial" charset="0"/>
+                <a:ea typeface="ＭＳ Ｐゴシック" charset="-128"/>
+              </a:defRPr>
+            </a:lvl6pPr>
+            <a:lvl7pPr marL="914400" eaLnBrk="0" fontAlgn="base" hangingPunct="0">
+              <a:spcBef>
+                <a:spcPct val="0"/>
+              </a:spcBef>
+              <a:spcAft>
+                <a:spcPct val="0"/>
+              </a:spcAft>
+              <a:defRPr sz="2400">
+                <a:solidFill>
+                  <a:schemeClr val="tx1"/>
+                </a:solidFill>
+                <a:latin typeface="Arial" charset="0"/>
+                <a:ea typeface="ＭＳ Ｐゴシック" charset="-128"/>
+              </a:defRPr>
+            </a:lvl7pPr>
+            <a:lvl8pPr marL="1371600" eaLnBrk="0" fontAlgn="base" hangingPunct="0">
+              <a:spcBef>
+                <a:spcPct val="0"/>
+              </a:spcBef>
+              <a:spcAft>
+                <a:spcPct val="0"/>
+              </a:spcAft>
+              <a:defRPr sz="2400">
+                <a:solidFill>
+                  <a:schemeClr val="tx1"/>
+                </a:solidFill>
+                <a:latin typeface="Arial" charset="0"/>
+                <a:ea typeface="ＭＳ Ｐゴシック" charset="-128"/>
+              </a:defRPr>
+            </a:lvl8pPr>
+            <a:lvl9pPr marL="1828800" eaLnBrk="0" fontAlgn="base" hangingPunct="0">
+              <a:spcBef>
+                <a:spcPct val="0"/>
+              </a:spcBef>
+              <a:spcAft>
+                <a:spcPct val="0"/>
+              </a:spcAft>
+              <a:defRPr sz="2400">
+                <a:solidFill>
+                  <a:schemeClr val="tx1"/>
+                </a:solidFill>
+                <a:latin typeface="Arial" charset="0"/>
+                <a:ea typeface="ＭＳ Ｐゴシック" charset="-128"/>
+              </a:defRPr>
+            </a:lvl9pPr>
+          </a:lstStyle>
+          <a:p>
+            <a:pPr algn="ctr" eaLnBrk="1" hangingPunct="1"/>
+            <a:endParaRPr lang="en-US" altLang="en-US" sz="1800">
+              <a:solidFill>
+                <a:srgbClr val="FFFFFF"/>
+              </a:solidFill>
+            </a:endParaRPr>
+          </a:p>
+        </p:txBody>
+      </p:sp>
     </p:spTree>
     <p:extLst>
       <p:ext uri="{BB962C8B-B14F-4D97-AF65-F5344CB8AC3E}">

</xml_diff>